<commit_message>
add else if to conditionals ppt
</commit_message>
<xml_diff>
--- a/Conditionals/Conditionals.pptx
+++ b/Conditionals/Conditionals.pptx
@@ -5,7 +5,7 @@
     <p:sldMasterId id="2147483648" r:id="rId1"/>
   </p:sldMasterIdLst>
   <p:notesMasterIdLst>
-    <p:notesMasterId r:id="rId25"/>
+    <p:notesMasterId r:id="rId26"/>
   </p:notesMasterIdLst>
   <p:sldIdLst>
     <p:sldId id="258" r:id="rId2"/>
@@ -21,16 +21,17 @@
     <p:sldId id="310" r:id="rId12"/>
     <p:sldId id="311" r:id="rId13"/>
     <p:sldId id="312" r:id="rId14"/>
-    <p:sldId id="313" r:id="rId15"/>
-    <p:sldId id="306" r:id="rId16"/>
-    <p:sldId id="314" r:id="rId17"/>
-    <p:sldId id="325" r:id="rId18"/>
-    <p:sldId id="315" r:id="rId19"/>
-    <p:sldId id="316" r:id="rId20"/>
-    <p:sldId id="317" r:id="rId21"/>
-    <p:sldId id="318" r:id="rId22"/>
-    <p:sldId id="319" r:id="rId23"/>
-    <p:sldId id="326" r:id="rId24"/>
+    <p:sldId id="327" r:id="rId15"/>
+    <p:sldId id="313" r:id="rId16"/>
+    <p:sldId id="306" r:id="rId17"/>
+    <p:sldId id="314" r:id="rId18"/>
+    <p:sldId id="325" r:id="rId19"/>
+    <p:sldId id="315" r:id="rId20"/>
+    <p:sldId id="316" r:id="rId21"/>
+    <p:sldId id="317" r:id="rId22"/>
+    <p:sldId id="318" r:id="rId23"/>
+    <p:sldId id="319" r:id="rId24"/>
+    <p:sldId id="326" r:id="rId25"/>
   </p:sldIdLst>
   <p:sldSz cx="12192000" cy="6858000"/>
   <p:notesSz cx="6858000" cy="9144000"/>
@@ -230,7 +231,7 @@
           <a:p>
             <a:fld id="{19104133-B5B0-4351-8158-4F0E5EB1E2BF}" type="datetimeFigureOut">
               <a:rPr lang="en-US" smtClean="0"/>
-              <a:t>9/6/2022</a:t>
+              <a:t>8/29/2023</a:t>
             </a:fld>
             <a:endParaRPr lang="en-US"/>
           </a:p>
@@ -648,92 +649,19 @@
           <a:p>
             <a:r>
               <a:rPr lang="en-US" dirty="0"/>
-              <a:t>This image</a:t>
+              <a:t>Show the</a:t>
             </a:r>
             <a:r>
               <a:rPr lang="en-US" baseline="0" dirty="0"/>
-              <a:t> helps visualize</a:t>
+              <a:t> syntax of an else if and explain that the code in the body of the </a:t>
             </a:r>
             <a:r>
               <a:rPr lang="en-US" b="1" baseline="0" dirty="0"/>
-              <a:t> </a:t>
+              <a:t>else if</a:t>
             </a:r>
             <a:r>
               <a:rPr lang="en-US" b="0" baseline="0" dirty="0"/>
-              <a:t>the </a:t>
-            </a:r>
-            <a:r>
-              <a:rPr lang="en-US" b="1" baseline="0" dirty="0"/>
-              <a:t>else</a:t>
-            </a:r>
-            <a:r>
-              <a:rPr lang="en-US" b="0" baseline="0" dirty="0"/>
-              <a:t> clause process.</a:t>
-            </a:r>
-          </a:p>
-          <a:p>
-            <a:endParaRPr lang="en-US" b="0" baseline="0" dirty="0"/>
-          </a:p>
-          <a:p>
-            <a:r>
-              <a:rPr lang="en-US" b="0" baseline="0" dirty="0"/>
-              <a:t>The execution of the code will reach the </a:t>
-            </a:r>
-            <a:r>
-              <a:rPr lang="en-US" b="1" baseline="0" dirty="0"/>
-              <a:t>if </a:t>
-            </a:r>
-            <a:r>
-              <a:rPr lang="en-US" b="0" baseline="0" dirty="0"/>
-              <a:t>statement, and it will check the value of the </a:t>
-            </a:r>
-            <a:r>
-              <a:rPr lang="en-US" b="0" i="1" baseline="0" dirty="0" err="1"/>
-              <a:t>boolean_expression</a:t>
-            </a:r>
-            <a:r>
-              <a:rPr lang="en-US" b="0" i="0" baseline="0" dirty="0"/>
-              <a:t>. If it is </a:t>
-            </a:r>
-            <a:r>
-              <a:rPr lang="en-US" b="1" i="0" baseline="0" dirty="0"/>
-              <a:t>true</a:t>
-            </a:r>
-            <a:r>
-              <a:rPr lang="en-US" b="0" i="0" baseline="0" dirty="0"/>
-              <a:t>, it will execute </a:t>
-            </a:r>
-            <a:r>
-              <a:rPr lang="en-US" b="0" i="1" baseline="0" dirty="0"/>
-              <a:t>statement1</a:t>
-            </a:r>
-            <a:r>
-              <a:rPr lang="en-US" b="0" i="0" baseline="0" dirty="0"/>
-              <a:t> from the body of the </a:t>
-            </a:r>
-            <a:r>
-              <a:rPr lang="en-US" b="1" i="0" baseline="0" dirty="0"/>
-              <a:t>if</a:t>
-            </a:r>
-            <a:r>
-              <a:rPr lang="en-US" b="0" i="0" baseline="0" dirty="0"/>
-              <a:t> statement. If it is </a:t>
-            </a:r>
-            <a:r>
-              <a:rPr lang="en-US" b="1" i="0" baseline="0" dirty="0"/>
-              <a:t>false</a:t>
-            </a:r>
-            <a:r>
-              <a:rPr lang="en-US" b="0" i="0" baseline="0" dirty="0"/>
-              <a:t>, it will execute </a:t>
-            </a:r>
-            <a:r>
-              <a:rPr lang="en-US" b="0" i="1" baseline="0" dirty="0"/>
-              <a:t>statement2</a:t>
-            </a:r>
-            <a:r>
-              <a:rPr lang="en-US" b="0" i="0" baseline="0" dirty="0"/>
-              <a:t> from the body of the else clause. Then, either way, it will move on.</a:t>
+              <a:t> will run if the first condition is false, but the second is true</a:t>
             </a:r>
             <a:endParaRPr lang="en-US" dirty="0"/>
           </a:p>
@@ -765,7 +693,7 @@
     </p:spTree>
     <p:extLst>
       <p:ext uri="{BB962C8B-B14F-4D97-AF65-F5344CB8AC3E}">
-        <p14:creationId xmlns:p14="http://schemas.microsoft.com/office/powerpoint/2010/main" val="551849894"/>
+        <p14:creationId xmlns:p14="http://schemas.microsoft.com/office/powerpoint/2010/main" val="3235760147"/>
       </p:ext>
     </p:extLst>
   </p:cSld>
@@ -821,19 +749,19 @@
           <a:p>
             <a:r>
               <a:rPr lang="en-US" dirty="0"/>
-              <a:t>For the Repl,</a:t>
+              <a:t>This image</a:t>
             </a:r>
             <a:r>
               <a:rPr lang="en-US" baseline="0" dirty="0"/>
-              <a:t> note how the </a:t>
+              <a:t> helps visualize</a:t>
             </a:r>
             <a:r>
               <a:rPr lang="en-US" b="1" baseline="0" dirty="0"/>
-              <a:t>if</a:t>
+              <a:t> </a:t>
             </a:r>
             <a:r>
               <a:rPr lang="en-US" b="0" baseline="0" dirty="0"/>
-              <a:t> statement and </a:t>
+              <a:t>the </a:t>
             </a:r>
             <a:r>
               <a:rPr lang="en-US" b="1" baseline="0" dirty="0"/>
@@ -841,9 +769,74 @@
             </a:r>
             <a:r>
               <a:rPr lang="en-US" b="0" baseline="0" dirty="0"/>
-              <a:t> clause work. Change around the values, and setup the prompt as well. Possibly add some new code to see how it can affect the outcome. </a:t>
-            </a:r>
-            <a:endParaRPr lang="en-US" baseline="0" dirty="0"/>
+              <a:t> clause process.</a:t>
+            </a:r>
+          </a:p>
+          <a:p>
+            <a:endParaRPr lang="en-US" b="0" baseline="0" dirty="0"/>
+          </a:p>
+          <a:p>
+            <a:r>
+              <a:rPr lang="en-US" b="0" baseline="0" dirty="0"/>
+              <a:t>The execution of the code will reach the </a:t>
+            </a:r>
+            <a:r>
+              <a:rPr lang="en-US" b="1" baseline="0" dirty="0"/>
+              <a:t>if </a:t>
+            </a:r>
+            <a:r>
+              <a:rPr lang="en-US" b="0" baseline="0" dirty="0"/>
+              <a:t>statement, and it will check the value of the </a:t>
+            </a:r>
+            <a:r>
+              <a:rPr lang="en-US" b="0" i="1" baseline="0" dirty="0" err="1"/>
+              <a:t>boolean_expression</a:t>
+            </a:r>
+            <a:r>
+              <a:rPr lang="en-US" b="0" i="0" baseline="0" dirty="0"/>
+              <a:t>. If it is </a:t>
+            </a:r>
+            <a:r>
+              <a:rPr lang="en-US" b="1" i="0" baseline="0" dirty="0"/>
+              <a:t>true</a:t>
+            </a:r>
+            <a:r>
+              <a:rPr lang="en-US" b="0" i="0" baseline="0" dirty="0"/>
+              <a:t>, it will execute </a:t>
+            </a:r>
+            <a:r>
+              <a:rPr lang="en-US" b="0" i="1" baseline="0" dirty="0"/>
+              <a:t>statement1</a:t>
+            </a:r>
+            <a:r>
+              <a:rPr lang="en-US" b="0" i="0" baseline="0" dirty="0"/>
+              <a:t> from the body of the </a:t>
+            </a:r>
+            <a:r>
+              <a:rPr lang="en-US" b="1" i="0" baseline="0" dirty="0"/>
+              <a:t>if</a:t>
+            </a:r>
+            <a:r>
+              <a:rPr lang="en-US" b="0" i="0" baseline="0" dirty="0"/>
+              <a:t> statement. If it is </a:t>
+            </a:r>
+            <a:r>
+              <a:rPr lang="en-US" b="1" i="0" baseline="0" dirty="0"/>
+              <a:t>false</a:t>
+            </a:r>
+            <a:r>
+              <a:rPr lang="en-US" b="0" i="0" baseline="0" dirty="0"/>
+              <a:t>, it will execute </a:t>
+            </a:r>
+            <a:r>
+              <a:rPr lang="en-US" b="0" i="1" baseline="0" dirty="0"/>
+              <a:t>statement2</a:t>
+            </a:r>
+            <a:r>
+              <a:rPr lang="en-US" b="0" i="0" baseline="0" dirty="0"/>
+              <a:t> from the body of the else clause. Then, either way, it will move on.</a:t>
+            </a:r>
+            <a:endParaRPr lang="en-US" dirty="0"/>
           </a:p>
         </p:txBody>
       </p:sp>
@@ -873,7 +866,7 @@
     </p:spTree>
     <p:extLst>
       <p:ext uri="{BB962C8B-B14F-4D97-AF65-F5344CB8AC3E}">
-        <p14:creationId xmlns:p14="http://schemas.microsoft.com/office/powerpoint/2010/main" val="4123238520"/>
+        <p14:creationId xmlns:p14="http://schemas.microsoft.com/office/powerpoint/2010/main" val="551849894"/>
       </p:ext>
     </p:extLst>
   </p:cSld>
@@ -927,55 +920,31 @@
           <a:bodyPr/>
           <a:lstStyle/>
           <a:p>
-            <a:pPr marL="0" marR="0" lvl="0" indent="0" algn="l" defTabSz="914400" rtl="0" eaLnBrk="1" fontAlgn="auto" latinLnBrk="0" hangingPunct="1">
-              <a:lnSpc>
-                <a:spcPct val="100000"/>
-              </a:lnSpc>
-              <a:spcBef>
-                <a:spcPts val="0"/>
-              </a:spcBef>
-              <a:spcAft>
-                <a:spcPts val="0"/>
-              </a:spcAft>
-              <a:buClrTx/>
-              <a:buSzTx/>
-              <a:buFontTx/>
-              <a:buNone/>
-              <a:tabLst/>
-              <a:defRPr/>
-            </a:pPr>
             <a:r>
               <a:rPr lang="en-US" dirty="0"/>
-              <a:t>Ask the students to try</a:t>
+              <a:t>For the Repl,</a:t>
             </a:r>
             <a:r>
               <a:rPr lang="en-US" baseline="0" dirty="0"/>
-              <a:t> and think of the code as English. For example: </a:t>
-            </a:r>
-            <a:r>
-              <a:rPr lang="en-US" sz="1200" dirty="0">
-                <a:solidFill>
-                  <a:srgbClr val="E13FB4"/>
-                </a:solidFill>
-              </a:rPr>
-              <a:t>If my balance is less than five, say </a:t>
-            </a:r>
-            <a:r>
-              <a:rPr lang="en-US" sz="1200" baseline="0" dirty="0">
-                <a:solidFill>
-                  <a:srgbClr val="E13FB4"/>
-                </a:solidFill>
-              </a:rPr>
-              <a:t>“You do not have enough money</a:t>
-            </a:r>
-            <a:r>
-              <a:rPr lang="en-US" sz="1200" dirty="0">
-                <a:solidFill>
-                  <a:srgbClr val="E13FB4"/>
-                </a:solidFill>
-              </a:rPr>
-              <a:t>!”  Otherwise, say “You have enough money!”</a:t>
-            </a:r>
+              <a:t> note how the </a:t>
+            </a:r>
+            <a:r>
+              <a:rPr lang="en-US" b="1" baseline="0" dirty="0"/>
+              <a:t>if</a:t>
+            </a:r>
+            <a:r>
+              <a:rPr lang="en-US" b="0" baseline="0" dirty="0"/>
+              <a:t> statement and </a:t>
+            </a:r>
+            <a:r>
+              <a:rPr lang="en-US" b="1" baseline="0" dirty="0"/>
+              <a:t>else</a:t>
+            </a:r>
+            <a:r>
+              <a:rPr lang="en-US" b="0" baseline="0" dirty="0"/>
+              <a:t> clause work. Change around the values, and setup the prompt as well. Possibly add some new code to see how it can affect the outcome. </a:t>
+            </a:r>
+            <a:endParaRPr lang="en-US" baseline="0" dirty="0"/>
           </a:p>
         </p:txBody>
       </p:sp>
@@ -1005,7 +974,7 @@
     </p:spTree>
     <p:extLst>
       <p:ext uri="{BB962C8B-B14F-4D97-AF65-F5344CB8AC3E}">
-        <p14:creationId xmlns:p14="http://schemas.microsoft.com/office/powerpoint/2010/main" val="1694090019"/>
+        <p14:creationId xmlns:p14="http://schemas.microsoft.com/office/powerpoint/2010/main" val="4123238520"/>
       </p:ext>
     </p:extLst>
   </p:cSld>
@@ -1078,21 +1047,35 @@
             </a:pPr>
             <a:r>
               <a:rPr lang="en-US" dirty="0"/>
-              <a:t>For this</a:t>
+              <a:t>Ask the students to try</a:t>
             </a:r>
             <a:r>
               <a:rPr lang="en-US" baseline="0" dirty="0"/>
-              <a:t> section, go around the room and ask the students to answer the questions</a:t>
-            </a:r>
-            <a:endParaRPr lang="en-US" dirty="0"/>
-          </a:p>
-          <a:p>
-            <a:endParaRPr lang="en-US" dirty="0"/>
-          </a:p>
-          <a:p>
-            <a:r>
-              <a:rPr lang="en-US" dirty="0"/>
-              <a:t>false</a:t>
+              <a:t> and think of the code as English. For example: </a:t>
+            </a:r>
+            <a:r>
+              <a:rPr lang="en-US" sz="1200" dirty="0">
+                <a:solidFill>
+                  <a:srgbClr val="E13FB4"/>
+                </a:solidFill>
+              </a:rPr>
+              <a:t>If my balance is less than five, say </a:t>
+            </a:r>
+            <a:r>
+              <a:rPr lang="en-US" sz="1200" baseline="0" dirty="0">
+                <a:solidFill>
+                  <a:srgbClr val="E13FB4"/>
+                </a:solidFill>
+              </a:rPr>
+              <a:t>“You do not have enough money</a:t>
+            </a:r>
+            <a:r>
+              <a:rPr lang="en-US" sz="1200" dirty="0">
+                <a:solidFill>
+                  <a:srgbClr val="E13FB4"/>
+                </a:solidFill>
+              </a:rPr>
+              <a:t>!”  Otherwise, say “You have enough money!”</a:t>
             </a:r>
           </a:p>
         </p:txBody>
@@ -1114,7 +1097,7 @@
           <a:p>
             <a:fld id="{DEC8F7F9-57EC-49CF-9FCD-2B781E4B449F}" type="slidenum">
               <a:rPr lang="en-US" smtClean="0"/>
-              <a:t>18</a:t>
+              <a:t>17</a:t>
             </a:fld>
             <a:endParaRPr lang="en-US"/>
           </a:p>
@@ -1123,7 +1106,7 @@
     </p:spTree>
     <p:extLst>
       <p:ext uri="{BB962C8B-B14F-4D97-AF65-F5344CB8AC3E}">
-        <p14:creationId xmlns:p14="http://schemas.microsoft.com/office/powerpoint/2010/main" val="3147754652"/>
+        <p14:creationId xmlns:p14="http://schemas.microsoft.com/office/powerpoint/2010/main" val="1694090019"/>
       </p:ext>
     </p:extLst>
   </p:cSld>
@@ -1177,9 +1160,40 @@
           <a:bodyPr/>
           <a:lstStyle/>
           <a:p>
+            <a:pPr marL="0" marR="0" lvl="0" indent="0" algn="l" defTabSz="914400" rtl="0" eaLnBrk="1" fontAlgn="auto" latinLnBrk="0" hangingPunct="1">
+              <a:lnSpc>
+                <a:spcPct val="100000"/>
+              </a:lnSpc>
+              <a:spcBef>
+                <a:spcPts val="0"/>
+              </a:spcBef>
+              <a:spcAft>
+                <a:spcPts val="0"/>
+              </a:spcAft>
+              <a:buClrTx/>
+              <a:buSzTx/>
+              <a:buFontTx/>
+              <a:buNone/>
+              <a:tabLst/>
+              <a:defRPr/>
+            </a:pPr>
             <a:r>
               <a:rPr lang="en-US" dirty="0"/>
-              <a:t>true</a:t>
+              <a:t>For this</a:t>
+            </a:r>
+            <a:r>
+              <a:rPr lang="en-US" baseline="0" dirty="0"/>
+              <a:t> section, go around the room and ask the students to answer the questions</a:t>
+            </a:r>
+            <a:endParaRPr lang="en-US" dirty="0"/>
+          </a:p>
+          <a:p>
+            <a:endParaRPr lang="en-US" dirty="0"/>
+          </a:p>
+          <a:p>
+            <a:r>
+              <a:rPr lang="en-US" dirty="0"/>
+              <a:t>false</a:t>
             </a:r>
           </a:p>
         </p:txBody>
@@ -1210,7 +1224,7 @@
     </p:spTree>
     <p:extLst>
       <p:ext uri="{BB962C8B-B14F-4D97-AF65-F5344CB8AC3E}">
-        <p14:creationId xmlns:p14="http://schemas.microsoft.com/office/powerpoint/2010/main" val="3909205565"/>
+        <p14:creationId xmlns:p14="http://schemas.microsoft.com/office/powerpoint/2010/main" val="3147754652"/>
       </p:ext>
     </p:extLst>
   </p:cSld>
@@ -1266,7 +1280,7 @@
           <a:p>
             <a:r>
               <a:rPr lang="en-US" dirty="0"/>
-              <a:t>false</a:t>
+              <a:t>true</a:t>
             </a:r>
           </a:p>
         </p:txBody>
@@ -1297,7 +1311,7 @@
     </p:spTree>
     <p:extLst>
       <p:ext uri="{BB962C8B-B14F-4D97-AF65-F5344CB8AC3E}">
-        <p14:creationId xmlns:p14="http://schemas.microsoft.com/office/powerpoint/2010/main" val="23014528"/>
+        <p14:creationId xmlns:p14="http://schemas.microsoft.com/office/powerpoint/2010/main" val="3909205565"/>
       </p:ext>
     </p:extLst>
   </p:cSld>
@@ -1353,7 +1367,7 @@
           <a:p>
             <a:r>
               <a:rPr lang="en-US" dirty="0"/>
-              <a:t>true</a:t>
+              <a:t>false</a:t>
             </a:r>
           </a:p>
         </p:txBody>
@@ -1384,7 +1398,7 @@
     </p:spTree>
     <p:extLst>
       <p:ext uri="{BB962C8B-B14F-4D97-AF65-F5344CB8AC3E}">
-        <p14:creationId xmlns:p14="http://schemas.microsoft.com/office/powerpoint/2010/main" val="991626845"/>
+        <p14:creationId xmlns:p14="http://schemas.microsoft.com/office/powerpoint/2010/main" val="23014528"/>
       </p:ext>
     </p:extLst>
   </p:cSld>
@@ -1440,15 +1454,7 @@
           <a:p>
             <a:r>
               <a:rPr lang="en-US" dirty="0"/>
-              <a:t>“</a:t>
-            </a:r>
-            <a:r>
-              <a:rPr lang="en-US" dirty="0" err="1"/>
-              <a:t>myBalance</a:t>
-            </a:r>
-            <a:r>
-              <a:rPr lang="en-US" dirty="0"/>
-              <a:t> is 14 or more!”</a:t>
+              <a:t>true</a:t>
             </a:r>
           </a:p>
         </p:txBody>
@@ -1471,6 +1477,101 @@
             <a:fld id="{DEC8F7F9-57EC-49CF-9FCD-2B781E4B449F}" type="slidenum">
               <a:rPr lang="en-US" smtClean="0"/>
               <a:t>22</a:t>
+            </a:fld>
+            <a:endParaRPr lang="en-US"/>
+          </a:p>
+        </p:txBody>
+      </p:sp>
+    </p:spTree>
+    <p:extLst>
+      <p:ext uri="{BB962C8B-B14F-4D97-AF65-F5344CB8AC3E}">
+        <p14:creationId xmlns:p14="http://schemas.microsoft.com/office/powerpoint/2010/main" val="991626845"/>
+      </p:ext>
+    </p:extLst>
+  </p:cSld>
+  <p:clrMapOvr>
+    <a:masterClrMapping/>
+  </p:clrMapOvr>
+</p:notes>
+</file>
+
+<file path=ppt/notesSlides/notesSlide18.xml><?xml version="1.0" encoding="utf-8"?>
+<p:notes xmlns:a="http://schemas.openxmlformats.org/drawingml/2006/main" xmlns:r="http://schemas.openxmlformats.org/officeDocument/2006/relationships" xmlns:p="http://schemas.openxmlformats.org/presentationml/2006/main">
+  <p:cSld>
+    <p:spTree>
+      <p:nvGrpSpPr>
+        <p:cNvPr id="1" name=""/>
+        <p:cNvGrpSpPr/>
+        <p:nvPr/>
+      </p:nvGrpSpPr>
+      <p:grpSpPr>
+        <a:xfrm>
+          <a:off x="0" y="0"/>
+          <a:ext cx="0" cy="0"/>
+          <a:chOff x="0" y="0"/>
+          <a:chExt cx="0" cy="0"/>
+        </a:xfrm>
+      </p:grpSpPr>
+      <p:sp>
+        <p:nvSpPr>
+          <p:cNvPr id="2" name="Slide Image Placeholder 1"/>
+          <p:cNvSpPr>
+            <a:spLocks noGrp="1" noRot="1" noChangeAspect="1"/>
+          </p:cNvSpPr>
+          <p:nvPr>
+            <p:ph type="sldImg"/>
+          </p:nvPr>
+        </p:nvSpPr>
+        <p:spPr/>
+      </p:sp>
+      <p:sp>
+        <p:nvSpPr>
+          <p:cNvPr id="3" name="Notes Placeholder 2"/>
+          <p:cNvSpPr>
+            <a:spLocks noGrp="1"/>
+          </p:cNvSpPr>
+          <p:nvPr>
+            <p:ph type="body" idx="1"/>
+          </p:nvPr>
+        </p:nvSpPr>
+        <p:spPr/>
+        <p:txBody>
+          <a:bodyPr/>
+          <a:lstStyle/>
+          <a:p>
+            <a:r>
+              <a:rPr lang="en-US" dirty="0"/>
+              <a:t>“</a:t>
+            </a:r>
+            <a:r>
+              <a:rPr lang="en-US" dirty="0" err="1"/>
+              <a:t>myBalance</a:t>
+            </a:r>
+            <a:r>
+              <a:rPr lang="en-US" dirty="0"/>
+              <a:t> is 14 or more!”</a:t>
+            </a:r>
+          </a:p>
+        </p:txBody>
+      </p:sp>
+      <p:sp>
+        <p:nvSpPr>
+          <p:cNvPr id="4" name="Slide Number Placeholder 3"/>
+          <p:cNvSpPr>
+            <a:spLocks noGrp="1"/>
+          </p:cNvSpPr>
+          <p:nvPr>
+            <p:ph type="sldNum" sz="quarter" idx="10"/>
+          </p:nvPr>
+        </p:nvSpPr>
+        <p:spPr/>
+        <p:txBody>
+          <a:bodyPr/>
+          <a:lstStyle/>
+          <a:p>
+            <a:fld id="{DEC8F7F9-57EC-49CF-9FCD-2B781E4B449F}" type="slidenum">
+              <a:rPr lang="en-US" smtClean="0"/>
+              <a:t>23</a:t>
             </a:fld>
             <a:endParaRPr lang="en-US"/>
           </a:p>
@@ -2845,7 +2946,7 @@
             <a:fld id="{1C2D31DE-C454-491C-B5C3-F097855E3DF7}" type="datetime4">
               <a:rPr lang="en-US" smtClean="0"/>
               <a:pPr/>
-              <a:t>September 6, 2022</a:t>
+              <a:t>August 29, 2023</a:t>
             </a:fld>
             <a:endParaRPr lang="en-US" dirty="0"/>
           </a:p>
@@ -6237,7 +6338,7 @@
           <a:p>
             <a:fld id="{5958763E-B898-436D-883D-03711491D54A}" type="datetimeFigureOut">
               <a:rPr lang="en-US" smtClean="0"/>
-              <a:t>9/6/2022</a:t>
+              <a:t>8/29/2023</a:t>
             </a:fld>
             <a:endParaRPr lang="en-US"/>
           </a:p>
@@ -6430,7 +6531,7 @@
           <a:p>
             <a:fld id="{5958763E-B898-436D-883D-03711491D54A}" type="datetimeFigureOut">
               <a:rPr lang="en-US" smtClean="0"/>
-              <a:t>9/6/2022</a:t>
+              <a:t>8/29/2023</a:t>
             </a:fld>
             <a:endParaRPr lang="en-US"/>
           </a:p>
@@ -6680,7 +6781,7 @@
           <a:p>
             <a:fld id="{5958763E-B898-436D-883D-03711491D54A}" type="datetimeFigureOut">
               <a:rPr lang="en-US" smtClean="0"/>
-              <a:t>9/6/2022</a:t>
+              <a:t>8/29/2023</a:t>
             </a:fld>
             <a:endParaRPr lang="en-US"/>
           </a:p>
@@ -7028,7 +7129,7 @@
           <a:p>
             <a:fld id="{5958763E-B898-436D-883D-03711491D54A}" type="datetimeFigureOut">
               <a:rPr lang="en-US" smtClean="0"/>
-              <a:t>9/6/2022</a:t>
+              <a:t>8/29/2023</a:t>
             </a:fld>
             <a:endParaRPr lang="en-US"/>
           </a:p>
@@ -7444,7 +7545,7 @@
           <a:p>
             <a:fld id="{5958763E-B898-436D-883D-03711491D54A}" type="datetimeFigureOut">
               <a:rPr lang="en-US" smtClean="0"/>
-              <a:t>9/6/2022</a:t>
+              <a:t>8/29/2023</a:t>
             </a:fld>
             <a:endParaRPr lang="en-US"/>
           </a:p>
@@ -7945,7 +8046,7 @@
           <a:p>
             <a:fld id="{5958763E-B898-436D-883D-03711491D54A}" type="datetimeFigureOut">
               <a:rPr lang="en-US" smtClean="0"/>
-              <a:t>9/6/2022</a:t>
+              <a:t>8/29/2023</a:t>
             </a:fld>
             <a:endParaRPr lang="en-US"/>
           </a:p>
@@ -8396,7 +8497,7 @@
           <a:p>
             <a:fld id="{5958763E-B898-436D-883D-03711491D54A}" type="datetimeFigureOut">
               <a:rPr lang="en-US" smtClean="0"/>
-              <a:t>9/6/2022</a:t>
+              <a:t>8/29/2023</a:t>
             </a:fld>
             <a:endParaRPr lang="en-US"/>
           </a:p>
@@ -9007,7 +9108,7 @@
           <a:p>
             <a:fld id="{5958763E-B898-436D-883D-03711491D54A}" type="datetimeFigureOut">
               <a:rPr lang="en-US" smtClean="0"/>
-              <a:t>9/6/2022</a:t>
+              <a:t>8/29/2023</a:t>
             </a:fld>
             <a:endParaRPr lang="en-US"/>
           </a:p>
@@ -9778,7 +9879,7 @@
           <a:p>
             <a:fld id="{5958763E-B898-436D-883D-03711491D54A}" type="datetimeFigureOut">
               <a:rPr lang="en-US" smtClean="0"/>
-              <a:t>9/6/2022</a:t>
+              <a:t>8/29/2023</a:t>
             </a:fld>
             <a:endParaRPr lang="en-US"/>
           </a:p>
@@ -9882,7 +9983,7 @@
           <a:p>
             <a:fld id="{5958763E-B898-436D-883D-03711491D54A}" type="datetimeFigureOut">
               <a:rPr lang="en-US" smtClean="0"/>
-              <a:t>9/6/2022</a:t>
+              <a:t>8/29/2023</a:t>
             </a:fld>
             <a:endParaRPr lang="en-US"/>
           </a:p>
@@ -10209,7 +10310,7 @@
             <a:fld id="{1C2D31DE-C454-491C-B5C3-F097855E3DF7}" type="datetime4">
               <a:rPr lang="en-US" smtClean="0"/>
               <a:pPr/>
-              <a:t>September 6, 2022</a:t>
+              <a:t>August 29, 2023</a:t>
             </a:fld>
             <a:endParaRPr lang="en-US" dirty="0"/>
           </a:p>
@@ -13361,7 +13462,7 @@
           <a:p>
             <a:fld id="{5958763E-B898-436D-883D-03711491D54A}" type="datetimeFigureOut">
               <a:rPr lang="en-US" smtClean="0"/>
-              <a:t>9/6/2022</a:t>
+              <a:t>8/29/2023</a:t>
             </a:fld>
             <a:endParaRPr lang="en-US"/>
           </a:p>
@@ -13485,7 +13586,7 @@
           <a:p>
             <a:fld id="{5958763E-B898-436D-883D-03711491D54A}" type="datetimeFigureOut">
               <a:rPr lang="en-US" smtClean="0"/>
-              <a:t>9/6/2022</a:t>
+              <a:t>8/29/2023</a:t>
             </a:fld>
             <a:endParaRPr lang="en-US"/>
           </a:p>
@@ -13609,7 +13710,7 @@
           <a:p>
             <a:fld id="{5958763E-B898-436D-883D-03711491D54A}" type="datetimeFigureOut">
               <a:rPr lang="en-US" smtClean="0"/>
-              <a:t>9/6/2022</a:t>
+              <a:t>8/29/2023</a:t>
             </a:fld>
             <a:endParaRPr lang="en-US"/>
           </a:p>
@@ -13733,7 +13834,7 @@
           <a:p>
             <a:fld id="{5958763E-B898-436D-883D-03711491D54A}" type="datetimeFigureOut">
               <a:rPr lang="en-US" smtClean="0"/>
-              <a:t>9/6/2022</a:t>
+              <a:t>8/29/2023</a:t>
             </a:fld>
             <a:endParaRPr lang="en-US"/>
           </a:p>
@@ -13857,7 +13958,7 @@
           <a:p>
             <a:fld id="{5958763E-B898-436D-883D-03711491D54A}" type="datetimeFigureOut">
               <a:rPr lang="en-US" smtClean="0"/>
-              <a:t>9/6/2022</a:t>
+              <a:t>8/29/2023</a:t>
             </a:fld>
             <a:endParaRPr lang="en-US"/>
           </a:p>
@@ -13981,7 +14082,7 @@
           <a:p>
             <a:fld id="{5958763E-B898-436D-883D-03711491D54A}" type="datetimeFigureOut">
               <a:rPr lang="en-US" smtClean="0"/>
-              <a:t>9/6/2022</a:t>
+              <a:t>8/29/2023</a:t>
             </a:fld>
             <a:endParaRPr lang="en-US"/>
           </a:p>
@@ -14105,7 +14206,7 @@
           <a:p>
             <a:fld id="{5958763E-B898-436D-883D-03711491D54A}" type="datetimeFigureOut">
               <a:rPr lang="en-US" smtClean="0"/>
-              <a:t>9/6/2022</a:t>
+              <a:t>8/29/2023</a:t>
             </a:fld>
             <a:endParaRPr lang="en-US"/>
           </a:p>
@@ -14229,7 +14330,7 @@
           <a:p>
             <a:fld id="{5958763E-B898-436D-883D-03711491D54A}" type="datetimeFigureOut">
               <a:rPr lang="en-US" smtClean="0"/>
-              <a:t>9/6/2022</a:t>
+              <a:t>8/29/2023</a:t>
             </a:fld>
             <a:endParaRPr lang="en-US"/>
           </a:p>
@@ -14362,7 +14463,7 @@
           <a:p>
             <a:fld id="{5958763E-B898-436D-883D-03711491D54A}" type="datetimeFigureOut">
               <a:rPr lang="en-US" smtClean="0"/>
-              <a:t>9/6/2022</a:t>
+              <a:t>8/29/2023</a:t>
             </a:fld>
             <a:endParaRPr lang="en-US"/>
           </a:p>
@@ -17701,7 +17802,7 @@
             <a:fld id="{1C2D31DE-C454-491C-B5C3-F097855E3DF7}" type="datetime4">
               <a:rPr lang="en-US" smtClean="0"/>
               <a:pPr/>
-              <a:t>September 6, 2022</a:t>
+              <a:t>August 29, 2023</a:t>
             </a:fld>
             <a:endParaRPr lang="en-US" dirty="0"/>
           </a:p>
@@ -29937,7 +30038,7 @@
           <a:p>
             <a:fld id="{5958763E-B898-436D-883D-03711491D54A}" type="datetimeFigureOut">
               <a:rPr lang="en-US" smtClean="0"/>
-              <a:t>9/6/2022</a:t>
+              <a:t>8/29/2023</a:t>
             </a:fld>
             <a:endParaRPr lang="en-US"/>
           </a:p>
@@ -30339,7 +30440,7 @@
           <a:p>
             <a:fld id="{5958763E-B898-436D-883D-03711491D54A}" type="datetimeFigureOut">
               <a:rPr lang="en-US" smtClean="0"/>
-              <a:t>9/6/2022</a:t>
+              <a:t>8/29/2023</a:t>
             </a:fld>
             <a:endParaRPr lang="en-US"/>
           </a:p>
@@ -30633,7 +30734,7 @@
           <a:p>
             <a:fld id="{5958763E-B898-436D-883D-03711491D54A}" type="datetimeFigureOut">
               <a:rPr lang="en-US" smtClean="0"/>
-              <a:t>9/6/2022</a:t>
+              <a:t>8/29/2023</a:t>
             </a:fld>
             <a:endParaRPr lang="en-US"/>
           </a:p>
@@ -30834,7 +30935,7 @@
           <a:p>
             <a:fld id="{5958763E-B898-436D-883D-03711491D54A}" type="datetimeFigureOut">
               <a:rPr lang="en-US" smtClean="0"/>
-              <a:t>9/6/2022</a:t>
+              <a:t>8/29/2023</a:t>
             </a:fld>
             <a:endParaRPr lang="en-US"/>
           </a:p>
@@ -31095,7 +31196,7 @@
           <a:p>
             <a:fld id="{5958763E-B898-436D-883D-03711491D54A}" type="datetimeFigureOut">
               <a:rPr lang="en-US" smtClean="0"/>
-              <a:t>9/6/2022</a:t>
+              <a:t>8/29/2023</a:t>
             </a:fld>
             <a:endParaRPr lang="en-US"/>
           </a:p>
@@ -31603,7 +31704,7 @@
           <a:p>
             <a:fld id="{5958763E-B898-436D-883D-03711491D54A}" type="datetimeFigureOut">
               <a:rPr lang="en-US" smtClean="0"/>
-              <a:t>9/6/2022</a:t>
+              <a:t>8/29/2023</a:t>
             </a:fld>
             <a:endParaRPr lang="en-US"/>
           </a:p>
@@ -32082,7 +32183,7 @@
           <a:p>
             <a:fld id="{5958763E-B898-436D-883D-03711491D54A}" type="datetimeFigureOut">
               <a:rPr lang="en-US" smtClean="0"/>
-              <a:t>9/6/2022</a:t>
+              <a:t>8/29/2023</a:t>
             </a:fld>
             <a:endParaRPr lang="en-US"/>
           </a:p>
@@ -32901,7 +33002,7 @@
           <a:p>
             <a:fld id="{5958763E-B898-436D-883D-03711491D54A}" type="datetimeFigureOut">
               <a:rPr lang="en-US" smtClean="0"/>
-              <a:t>9/6/2022</a:t>
+              <a:t>8/29/2023</a:t>
             </a:fld>
             <a:endParaRPr lang="en-US"/>
           </a:p>
@@ -33102,7 +33203,7 @@
           <a:p>
             <a:fld id="{5958763E-B898-436D-883D-03711491D54A}" type="datetimeFigureOut">
               <a:rPr lang="en-US" smtClean="0"/>
-              <a:t>9/6/2022</a:t>
+              <a:t>8/29/2023</a:t>
             </a:fld>
             <a:endParaRPr lang="en-US"/>
           </a:p>
@@ -33437,7 +33538,7 @@
           <a:p>
             <a:fld id="{5958763E-B898-436D-883D-03711491D54A}" type="datetimeFigureOut">
               <a:rPr lang="en-US" smtClean="0"/>
-              <a:t>9/6/2022</a:t>
+              <a:t>8/29/2023</a:t>
             </a:fld>
             <a:endParaRPr lang="en-US"/>
           </a:p>
@@ -33667,7 +33768,7 @@
           <a:p>
             <a:fld id="{5958763E-B898-436D-883D-03711491D54A}" type="datetimeFigureOut">
               <a:rPr lang="en-US" smtClean="0"/>
-              <a:t>9/6/2022</a:t>
+              <a:t>8/29/2023</a:t>
             </a:fld>
             <a:endParaRPr lang="en-US"/>
           </a:p>
@@ -33911,7 +34012,7 @@
           <a:p>
             <a:fld id="{5958763E-B898-436D-883D-03711491D54A}" type="datetimeFigureOut">
               <a:rPr lang="en-US" smtClean="0"/>
-              <a:t>9/6/2022</a:t>
+              <a:t>8/29/2023</a:t>
             </a:fld>
             <a:endParaRPr lang="en-US"/>
           </a:p>
@@ -39142,6 +39243,468 @@
           <a:lstStyle/>
           <a:p>
             <a:r>
+              <a:rPr lang="en-US" sz="4000" cap="none">
+                <a:solidFill>
+                  <a:schemeClr val="accent1">
+                    <a:lumMod val="50000"/>
+                  </a:schemeClr>
+                </a:solidFill>
+                <a:latin typeface="Consolas" panose="020B0609020204030204" pitchFamily="49" charset="0"/>
+              </a:rPr>
+              <a:t>else if</a:t>
+            </a:r>
+            <a:endParaRPr lang="en-US" dirty="0"/>
+          </a:p>
+        </p:txBody>
+      </p:sp>
+      <p:sp>
+        <p:nvSpPr>
+          <p:cNvPr id="3" name="Content Placeholder 2"/>
+          <p:cNvSpPr>
+            <a:spLocks noGrp="1"/>
+          </p:cNvSpPr>
+          <p:nvPr>
+            <p:ph idx="1"/>
+          </p:nvPr>
+        </p:nvSpPr>
+        <p:spPr/>
+        <p:txBody>
+          <a:bodyPr>
+            <a:normAutofit/>
+          </a:bodyPr>
+          <a:lstStyle/>
+          <a:p>
+            <a:pPr marL="0" indent="0">
+              <a:buNone/>
+            </a:pPr>
+            <a:r>
+              <a:rPr lang="en-US" sz="4800" dirty="0">
+                <a:solidFill>
+                  <a:srgbClr val="0000CD"/>
+                </a:solidFill>
+                <a:latin typeface="Consolas" panose="020B0609020204030204" pitchFamily="49" charset="0"/>
+              </a:rPr>
+              <a:t>if</a:t>
+            </a:r>
+            <a:r>
+              <a:rPr lang="en-US" sz="4800" dirty="0">
+                <a:solidFill>
+                  <a:srgbClr val="000000"/>
+                </a:solidFill>
+                <a:latin typeface="Consolas" panose="020B0609020204030204" pitchFamily="49" charset="0"/>
+              </a:rPr>
+              <a:t> (time &lt; </a:t>
+            </a:r>
+            <a:r>
+              <a:rPr lang="en-US" sz="4800" dirty="0">
+                <a:solidFill>
+                  <a:srgbClr val="FF0000"/>
+                </a:solidFill>
+                <a:latin typeface="Consolas" panose="020B0609020204030204" pitchFamily="49" charset="0"/>
+              </a:rPr>
+              <a:t>10</a:t>
+            </a:r>
+            <a:r>
+              <a:rPr lang="en-US" sz="4800" dirty="0">
+                <a:solidFill>
+                  <a:srgbClr val="000000"/>
+                </a:solidFill>
+                <a:latin typeface="Consolas" panose="020B0609020204030204" pitchFamily="49" charset="0"/>
+              </a:rPr>
+              <a:t>) {</a:t>
+            </a:r>
+            <a:br>
+              <a:rPr lang="en-US" sz="4800" dirty="0">
+                <a:latin typeface="Consolas" panose="020B0609020204030204" pitchFamily="49" charset="0"/>
+              </a:rPr>
+            </a:br>
+            <a:r>
+              <a:rPr lang="en-US" sz="4800" dirty="0">
+                <a:solidFill>
+                  <a:srgbClr val="000000"/>
+                </a:solidFill>
+                <a:latin typeface="Consolas" panose="020B0609020204030204" pitchFamily="49" charset="0"/>
+              </a:rPr>
+              <a:t>	</a:t>
+            </a:r>
+            <a:r>
+              <a:rPr lang="en-US" sz="4400" dirty="0">
+                <a:solidFill>
+                  <a:srgbClr val="000000"/>
+                </a:solidFill>
+                <a:latin typeface="Consolas" panose="020B0609020204030204" pitchFamily="49" charset="0"/>
+              </a:rPr>
+              <a:t>alert(</a:t>
+            </a:r>
+            <a:r>
+              <a:rPr lang="en-US" sz="4400" dirty="0">
+                <a:solidFill>
+                  <a:srgbClr val="A52A2A"/>
+                </a:solidFill>
+                <a:latin typeface="Consolas" panose="020B0609020204030204" pitchFamily="49" charset="0"/>
+              </a:rPr>
+              <a:t>"Good morning"</a:t>
+            </a:r>
+            <a:r>
+              <a:rPr lang="en-US" sz="4400" dirty="0">
+                <a:solidFill>
+                  <a:srgbClr val="000000"/>
+                </a:solidFill>
+                <a:latin typeface="Consolas" panose="020B0609020204030204" pitchFamily="49" charset="0"/>
+              </a:rPr>
+              <a:t>);</a:t>
+            </a:r>
+            <a:br>
+              <a:rPr lang="en-US" sz="4800" dirty="0">
+                <a:latin typeface="Consolas" panose="020B0609020204030204" pitchFamily="49" charset="0"/>
+              </a:rPr>
+            </a:br>
+            <a:r>
+              <a:rPr lang="en-US" sz="4800" dirty="0">
+                <a:solidFill>
+                  <a:srgbClr val="000000"/>
+                </a:solidFill>
+                <a:latin typeface="Consolas" panose="020B0609020204030204" pitchFamily="49" charset="0"/>
+              </a:rPr>
+              <a:t>} </a:t>
+            </a:r>
+            <a:r>
+              <a:rPr lang="en-US" sz="4800" b="1" dirty="0">
+                <a:solidFill>
+                  <a:srgbClr val="0000CD"/>
+                </a:solidFill>
+                <a:latin typeface="Consolas" panose="020B0609020204030204" pitchFamily="49" charset="0"/>
+              </a:rPr>
+              <a:t>else</a:t>
+            </a:r>
+            <a:r>
+              <a:rPr lang="en-US" sz="4800" b="1" dirty="0">
+                <a:solidFill>
+                  <a:srgbClr val="000000"/>
+                </a:solidFill>
+                <a:latin typeface="Consolas" panose="020B0609020204030204" pitchFamily="49" charset="0"/>
+              </a:rPr>
+              <a:t> </a:t>
+            </a:r>
+            <a:r>
+              <a:rPr lang="en-US" sz="4800" b="1" dirty="0">
+                <a:solidFill>
+                  <a:srgbClr val="0000CD"/>
+                </a:solidFill>
+                <a:latin typeface="Consolas" panose="020B0609020204030204" pitchFamily="49" charset="0"/>
+              </a:rPr>
+              <a:t>if</a:t>
+            </a:r>
+            <a:r>
+              <a:rPr lang="en-US" sz="4800" b="1" dirty="0">
+                <a:solidFill>
+                  <a:srgbClr val="000000"/>
+                </a:solidFill>
+                <a:latin typeface="Consolas" panose="020B0609020204030204" pitchFamily="49" charset="0"/>
+              </a:rPr>
+              <a:t> (time &lt; </a:t>
+            </a:r>
+            <a:r>
+              <a:rPr lang="en-US" sz="4800" b="1" dirty="0">
+                <a:solidFill>
+                  <a:srgbClr val="FF0000"/>
+                </a:solidFill>
+                <a:latin typeface="Consolas" panose="020B0609020204030204" pitchFamily="49" charset="0"/>
+              </a:rPr>
+              <a:t>20</a:t>
+            </a:r>
+            <a:r>
+              <a:rPr lang="en-US" sz="4800" b="1" dirty="0">
+                <a:solidFill>
+                  <a:srgbClr val="000000"/>
+                </a:solidFill>
+                <a:latin typeface="Consolas" panose="020B0609020204030204" pitchFamily="49" charset="0"/>
+              </a:rPr>
+              <a:t>)</a:t>
+            </a:r>
+            <a:r>
+              <a:rPr lang="en-US" sz="4800" dirty="0">
+                <a:solidFill>
+                  <a:srgbClr val="000000"/>
+                </a:solidFill>
+                <a:latin typeface="Consolas" panose="020B0609020204030204" pitchFamily="49" charset="0"/>
+              </a:rPr>
+              <a:t> {</a:t>
+            </a:r>
+            <a:br>
+              <a:rPr lang="en-US" sz="4800" dirty="0">
+                <a:latin typeface="Consolas" panose="020B0609020204030204" pitchFamily="49" charset="0"/>
+              </a:rPr>
+            </a:br>
+            <a:r>
+              <a:rPr lang="en-US" sz="4800" dirty="0">
+                <a:solidFill>
+                  <a:srgbClr val="000000"/>
+                </a:solidFill>
+                <a:latin typeface="Consolas" panose="020B0609020204030204" pitchFamily="49" charset="0"/>
+              </a:rPr>
+              <a:t>	</a:t>
+            </a:r>
+            <a:r>
+              <a:rPr lang="en-US" sz="4400" dirty="0">
+                <a:solidFill>
+                  <a:srgbClr val="000000"/>
+                </a:solidFill>
+                <a:latin typeface="Consolas" panose="020B0609020204030204" pitchFamily="49" charset="0"/>
+              </a:rPr>
+              <a:t>alert(</a:t>
+            </a:r>
+            <a:r>
+              <a:rPr lang="en-US" sz="4400" dirty="0">
+                <a:solidFill>
+                  <a:srgbClr val="A52A2A"/>
+                </a:solidFill>
+                <a:latin typeface="Consolas" panose="020B0609020204030204" pitchFamily="49" charset="0"/>
+              </a:rPr>
+              <a:t>"Good day"</a:t>
+            </a:r>
+            <a:r>
+              <a:rPr lang="en-US" sz="4400" dirty="0">
+                <a:solidFill>
+                  <a:srgbClr val="000000"/>
+                </a:solidFill>
+                <a:latin typeface="Consolas" panose="020B0609020204030204" pitchFamily="49" charset="0"/>
+              </a:rPr>
+              <a:t>);</a:t>
+            </a:r>
+            <a:br>
+              <a:rPr lang="en-US" sz="4800" dirty="0">
+                <a:latin typeface="Consolas" panose="020B0609020204030204" pitchFamily="49" charset="0"/>
+              </a:rPr>
+            </a:br>
+            <a:r>
+              <a:rPr lang="en-US" sz="4800" dirty="0">
+                <a:solidFill>
+                  <a:srgbClr val="000000"/>
+                </a:solidFill>
+                <a:latin typeface="Consolas" panose="020B0609020204030204" pitchFamily="49" charset="0"/>
+              </a:rPr>
+              <a:t>} </a:t>
+            </a:r>
+            <a:r>
+              <a:rPr lang="en-US" sz="4800" dirty="0">
+                <a:solidFill>
+                  <a:srgbClr val="0000CD"/>
+                </a:solidFill>
+                <a:latin typeface="Consolas" panose="020B0609020204030204" pitchFamily="49" charset="0"/>
+              </a:rPr>
+              <a:t>else</a:t>
+            </a:r>
+            <a:r>
+              <a:rPr lang="en-US" sz="4800" dirty="0">
+                <a:solidFill>
+                  <a:srgbClr val="000000"/>
+                </a:solidFill>
+                <a:latin typeface="Consolas" panose="020B0609020204030204" pitchFamily="49" charset="0"/>
+              </a:rPr>
+              <a:t> {</a:t>
+            </a:r>
+            <a:br>
+              <a:rPr lang="en-US" sz="4800" dirty="0">
+                <a:latin typeface="Consolas" panose="020B0609020204030204" pitchFamily="49" charset="0"/>
+              </a:rPr>
+            </a:br>
+            <a:r>
+              <a:rPr lang="en-US" sz="4800" dirty="0">
+                <a:solidFill>
+                  <a:srgbClr val="000000"/>
+                </a:solidFill>
+                <a:latin typeface="Consolas" panose="020B0609020204030204" pitchFamily="49" charset="0"/>
+              </a:rPr>
+              <a:t>	</a:t>
+            </a:r>
+            <a:r>
+              <a:rPr lang="en-US" sz="4400" dirty="0">
+                <a:solidFill>
+                  <a:srgbClr val="000000"/>
+                </a:solidFill>
+                <a:latin typeface="Consolas" panose="020B0609020204030204" pitchFamily="49" charset="0"/>
+              </a:rPr>
+              <a:t>alert(</a:t>
+            </a:r>
+            <a:r>
+              <a:rPr lang="en-US" sz="4400" dirty="0">
+                <a:solidFill>
+                  <a:srgbClr val="A52A2A"/>
+                </a:solidFill>
+                <a:latin typeface="Consolas" panose="020B0609020204030204" pitchFamily="49" charset="0"/>
+              </a:rPr>
+              <a:t>"Good evening"</a:t>
+            </a:r>
+            <a:r>
+              <a:rPr lang="en-US" sz="4400" dirty="0">
+                <a:solidFill>
+                  <a:srgbClr val="000000"/>
+                </a:solidFill>
+                <a:latin typeface="Consolas" panose="020B0609020204030204" pitchFamily="49" charset="0"/>
+              </a:rPr>
+              <a:t>);</a:t>
+            </a:r>
+            <a:br>
+              <a:rPr lang="en-US" sz="4800" dirty="0">
+                <a:latin typeface="Consolas" panose="020B0609020204030204" pitchFamily="49" charset="0"/>
+              </a:rPr>
+            </a:br>
+            <a:r>
+              <a:rPr lang="en-US" sz="4800" dirty="0">
+                <a:solidFill>
+                  <a:srgbClr val="000000"/>
+                </a:solidFill>
+                <a:latin typeface="Consolas" panose="020B0609020204030204" pitchFamily="49" charset="0"/>
+              </a:rPr>
+              <a:t>}</a:t>
+            </a:r>
+          </a:p>
+        </p:txBody>
+      </p:sp>
+    </p:spTree>
+    <p:extLst>
+      <p:ext uri="{BB962C8B-B14F-4D97-AF65-F5344CB8AC3E}">
+        <p14:creationId xmlns:p14="http://schemas.microsoft.com/office/powerpoint/2010/main" val="353371669"/>
+      </p:ext>
+    </p:extLst>
+  </p:cSld>
+  <p:clrMapOvr>
+    <a:masterClrMapping/>
+  </p:clrMapOvr>
+  <p:transition>
+    <p:fade/>
+  </p:transition>
+  <p:timing>
+    <p:tnLst>
+      <p:par>
+        <p:cTn id="1" dur="indefinite" restart="never" nodeType="tmRoot">
+          <p:childTnLst>
+            <p:seq concurrent="1" nextAc="seek">
+              <p:cTn id="2" dur="indefinite" nodeType="mainSeq">
+                <p:childTnLst>
+                  <p:par>
+                    <p:cTn id="3" fill="hold">
+                      <p:stCondLst>
+                        <p:cond delay="indefinite"/>
+                      </p:stCondLst>
+                      <p:childTnLst>
+                        <p:par>
+                          <p:cTn id="4" fill="hold">
+                            <p:stCondLst>
+                              <p:cond delay="0"/>
+                            </p:stCondLst>
+                            <p:childTnLst>
+                              <p:par>
+                                <p:cTn id="5" presetID="10" presetClass="entr" presetSubtype="0" fill="hold" grpId="0" nodeType="clickEffect">
+                                  <p:stCondLst>
+                                    <p:cond delay="0"/>
+                                  </p:stCondLst>
+                                  <p:childTnLst>
+                                    <p:set>
+                                      <p:cBhvr>
+                                        <p:cTn id="6" dur="1" fill="hold">
+                                          <p:stCondLst>
+                                            <p:cond delay="0"/>
+                                          </p:stCondLst>
+                                        </p:cTn>
+                                        <p:tgtEl>
+                                          <p:spTgt spid="3">
+                                            <p:txEl>
+                                              <p:pRg st="0" end="0"/>
+                                            </p:txEl>
+                                          </p:spTgt>
+                                        </p:tgtEl>
+                                        <p:attrNameLst>
+                                          <p:attrName>style.visibility</p:attrName>
+                                        </p:attrNameLst>
+                                      </p:cBhvr>
+                                      <p:to>
+                                        <p:strVal val="visible"/>
+                                      </p:to>
+                                    </p:set>
+                                    <p:animEffect transition="in" filter="fade">
+                                      <p:cBhvr>
+                                        <p:cTn id="7" dur="500"/>
+                                        <p:tgtEl>
+                                          <p:spTgt spid="3">
+                                            <p:txEl>
+                                              <p:pRg st="0" end="0"/>
+                                            </p:txEl>
+                                          </p:spTgt>
+                                        </p:tgtEl>
+                                      </p:cBhvr>
+                                    </p:animEffect>
+                                  </p:childTnLst>
+                                </p:cTn>
+                              </p:par>
+                            </p:childTnLst>
+                          </p:cTn>
+                        </p:par>
+                      </p:childTnLst>
+                    </p:cTn>
+                  </p:par>
+                </p:childTnLst>
+              </p:cTn>
+              <p:prevCondLst>
+                <p:cond evt="onPrev" delay="0">
+                  <p:tgtEl>
+                    <p:sldTgt/>
+                  </p:tgtEl>
+                </p:cond>
+              </p:prevCondLst>
+              <p:nextCondLst>
+                <p:cond evt="onNext" delay="0">
+                  <p:tgtEl>
+                    <p:sldTgt/>
+                  </p:tgtEl>
+                </p:cond>
+              </p:nextCondLst>
+            </p:seq>
+          </p:childTnLst>
+        </p:cTn>
+      </p:par>
+    </p:tnLst>
+    <p:bldLst>
+      <p:bldP spid="3" grpId="0" uiExpand="1" build="p"/>
+    </p:bldLst>
+  </p:timing>
+</p:sld>
+</file>
+
+<file path=ppt/slides/slide15.xml><?xml version="1.0" encoding="utf-8"?>
+<p:sld xmlns:a="http://schemas.openxmlformats.org/drawingml/2006/main" xmlns:r="http://schemas.openxmlformats.org/officeDocument/2006/relationships" xmlns:p="http://schemas.openxmlformats.org/presentationml/2006/main">
+  <p:cSld>
+    <p:spTree>
+      <p:nvGrpSpPr>
+        <p:cNvPr id="1" name=""/>
+        <p:cNvGrpSpPr/>
+        <p:nvPr/>
+      </p:nvGrpSpPr>
+      <p:grpSpPr>
+        <a:xfrm>
+          <a:off x="0" y="0"/>
+          <a:ext cx="0" cy="0"/>
+          <a:chOff x="0" y="0"/>
+          <a:chExt cx="0" cy="0"/>
+        </a:xfrm>
+      </p:grpSpPr>
+      <p:sp>
+        <p:nvSpPr>
+          <p:cNvPr id="2" name="Title 1"/>
+          <p:cNvSpPr>
+            <a:spLocks noGrp="1"/>
+          </p:cNvSpPr>
+          <p:nvPr>
+            <p:ph type="title"/>
+          </p:nvPr>
+        </p:nvSpPr>
+        <p:spPr/>
+        <p:txBody>
+          <a:bodyPr/>
+          <a:lstStyle/>
+          <a:p>
+            <a:r>
               <a:rPr lang="en-US" dirty="0"/>
               <a:t>The </a:t>
             </a:r>
@@ -39204,7 +39767,7 @@
 </p:sld>
 </file>
 
-<file path=ppt/slides/slide15.xml><?xml version="1.0" encoding="utf-8"?>
+<file path=ppt/slides/slide16.xml><?xml version="1.0" encoding="utf-8"?>
 <p:sld xmlns:a="http://schemas.openxmlformats.org/drawingml/2006/main" xmlns:r="http://schemas.openxmlformats.org/officeDocument/2006/relationships" xmlns:p="http://schemas.openxmlformats.org/presentationml/2006/main">
   <p:cSld>
     <p:bg>
@@ -39299,7 +39862,7 @@
 </p:sld>
 </file>
 
-<file path=ppt/slides/slide16.xml><?xml version="1.0" encoding="utf-8"?>
+<file path=ppt/slides/slide17.xml><?xml version="1.0" encoding="utf-8"?>
 <p:sld xmlns:a="http://schemas.openxmlformats.org/drawingml/2006/main" xmlns:r="http://schemas.openxmlformats.org/officeDocument/2006/relationships" xmlns:p="http://schemas.openxmlformats.org/presentationml/2006/main">
   <p:cSld>
     <p:spTree>
@@ -39566,7 +40129,7 @@
 </p:sld>
 </file>
 
-<file path=ppt/slides/slide17.xml><?xml version="1.0" encoding="utf-8"?>
+<file path=ppt/slides/slide18.xml><?xml version="1.0" encoding="utf-8"?>
 <p:sld xmlns:a="http://schemas.openxmlformats.org/drawingml/2006/main" xmlns:r="http://schemas.openxmlformats.org/officeDocument/2006/relationships" xmlns:p="http://schemas.openxmlformats.org/presentationml/2006/main">
   <p:cSld>
     <p:spTree>
@@ -39748,117 +40311,6 @@
 </p:sld>
 </file>
 
-<file path=ppt/slides/slide18.xml><?xml version="1.0" encoding="utf-8"?>
-<p:sld xmlns:a="http://schemas.openxmlformats.org/drawingml/2006/main" xmlns:r="http://schemas.openxmlformats.org/officeDocument/2006/relationships" xmlns:p="http://schemas.openxmlformats.org/presentationml/2006/main">
-  <p:cSld>
-    <p:spTree>
-      <p:nvGrpSpPr>
-        <p:cNvPr id="1" name=""/>
-        <p:cNvGrpSpPr/>
-        <p:nvPr/>
-      </p:nvGrpSpPr>
-      <p:grpSpPr>
-        <a:xfrm>
-          <a:off x="0" y="0"/>
-          <a:ext cx="0" cy="0"/>
-          <a:chOff x="0" y="0"/>
-          <a:chExt cx="0" cy="0"/>
-        </a:xfrm>
-      </p:grpSpPr>
-      <p:sp>
-        <p:nvSpPr>
-          <p:cNvPr id="2" name="Title 1"/>
-          <p:cNvSpPr>
-            <a:spLocks noGrp="1"/>
-          </p:cNvSpPr>
-          <p:nvPr>
-            <p:ph type="title"/>
-          </p:nvPr>
-        </p:nvSpPr>
-        <p:spPr/>
-        <p:txBody>
-          <a:bodyPr/>
-          <a:lstStyle/>
-          <a:p>
-            <a:r>
-              <a:rPr lang="en-US" dirty="0"/>
-              <a:t>Mini-quiz: What’s the value?</a:t>
-            </a:r>
-          </a:p>
-        </p:txBody>
-      </p:sp>
-      <p:sp>
-        <p:nvSpPr>
-          <p:cNvPr id="3" name="Content Placeholder 2"/>
-          <p:cNvSpPr>
-            <a:spLocks noGrp="1"/>
-          </p:cNvSpPr>
-          <p:nvPr>
-            <p:ph idx="1"/>
-          </p:nvPr>
-        </p:nvSpPr>
-        <p:spPr/>
-        <p:txBody>
-          <a:bodyPr anchor="ctr">
-            <a:normAutofit/>
-          </a:bodyPr>
-          <a:lstStyle/>
-          <a:p>
-            <a:pPr marL="57150" indent="0" algn="ctr">
-              <a:buNone/>
-            </a:pPr>
-            <a:r>
-              <a:rPr lang="en-US" sz="11500" dirty="0">
-                <a:solidFill>
-                  <a:srgbClr val="098658"/>
-                </a:solidFill>
-                <a:latin typeface="Consolas" panose="020B0609020204030204" pitchFamily="49" charset="0"/>
-              </a:rPr>
-              <a:t>5</a:t>
-            </a:r>
-            <a:r>
-              <a:rPr lang="en-US" sz="11500" dirty="0">
-                <a:solidFill>
-                  <a:srgbClr val="000000"/>
-                </a:solidFill>
-                <a:latin typeface="Consolas" panose="020B0609020204030204" pitchFamily="49" charset="0"/>
-              </a:rPr>
-              <a:t> &gt; </a:t>
-            </a:r>
-            <a:r>
-              <a:rPr lang="en-US" sz="11500" dirty="0">
-                <a:solidFill>
-                  <a:srgbClr val="098658"/>
-                </a:solidFill>
-                <a:latin typeface="Consolas" panose="020B0609020204030204" pitchFamily="49" charset="0"/>
-              </a:rPr>
-              <a:t>5</a:t>
-            </a:r>
-            <a:endParaRPr lang="en-US" sz="11500" dirty="0">
-              <a:solidFill>
-                <a:srgbClr val="000000"/>
-              </a:solidFill>
-              <a:latin typeface="Consolas" panose="020B0609020204030204" pitchFamily="49" charset="0"/>
-            </a:endParaRPr>
-          </a:p>
-        </p:txBody>
-      </p:sp>
-    </p:spTree>
-    <p:extLst>
-      <p:ext uri="{BB962C8B-B14F-4D97-AF65-F5344CB8AC3E}">
-        <p14:creationId xmlns:p14="http://schemas.microsoft.com/office/powerpoint/2010/main" val="2521062439"/>
-      </p:ext>
-    </p:extLst>
-  </p:cSld>
-  <p:clrMapOvr>
-    <a:masterClrMapping/>
-  </p:clrMapOvr>
-  <p:transition>
-    <p:fade/>
-  </p:transition>
-</p:sld>
-</file>
-
 <file path=ppt/slides/slide19.xml><?xml version="1.0" encoding="utf-8"?>
 <p:sld xmlns:a="http://schemas.openxmlformats.org/drawingml/2006/main" xmlns:r="http://schemas.openxmlformats.org/officeDocument/2006/relationships" xmlns:p="http://schemas.openxmlformats.org/presentationml/2006/main">
   <p:cSld>
@@ -39915,17 +40367,17 @@
           </a:bodyPr>
           <a:lstStyle/>
           <a:p>
-            <a:pPr marL="0" indent="0" algn="ctr">
+            <a:pPr marL="57150" indent="0" algn="ctr">
               <a:buNone/>
             </a:pPr>
             <a:r>
               <a:rPr lang="en-US" sz="11500" dirty="0">
                 <a:solidFill>
-                  <a:srgbClr val="A31515"/>
+                  <a:srgbClr val="098658"/>
                 </a:solidFill>
                 <a:latin typeface="Consolas" panose="020B0609020204030204" pitchFamily="49" charset="0"/>
               </a:rPr>
-              <a:t>"Hi"</a:t>
+              <a:t>5</a:t>
             </a:r>
             <a:r>
               <a:rPr lang="en-US" sz="11500" dirty="0">
@@ -39934,16 +40386,16 @@
                 </a:solidFill>
                 <a:latin typeface="Consolas" panose="020B0609020204030204" pitchFamily="49" charset="0"/>
               </a:rPr>
-              <a:t> === </a:t>
+              <a:t> &gt; </a:t>
             </a:r>
             <a:r>
               <a:rPr lang="en-US" sz="11500" dirty="0">
                 <a:solidFill>
-                  <a:srgbClr val="A31515"/>
+                  <a:srgbClr val="098658"/>
                 </a:solidFill>
                 <a:latin typeface="Consolas" panose="020B0609020204030204" pitchFamily="49" charset="0"/>
               </a:rPr>
-              <a:t>"Hi"</a:t>
+              <a:t>5</a:t>
             </a:r>
             <a:endParaRPr lang="en-US" sz="11500" dirty="0">
               <a:solidFill>
@@ -39957,7 +40409,7 @@
     </p:spTree>
     <p:extLst>
       <p:ext uri="{BB962C8B-B14F-4D97-AF65-F5344CB8AC3E}">
-        <p14:creationId xmlns:p14="http://schemas.microsoft.com/office/powerpoint/2010/main" val="768053228"/>
+        <p14:creationId xmlns:p14="http://schemas.microsoft.com/office/powerpoint/2010/main" val="2521062439"/>
       </p:ext>
     </p:extLst>
   </p:cSld>
@@ -40136,6 +40588,117 @@
               <a:buNone/>
             </a:pPr>
             <a:r>
+              <a:rPr lang="en-US" sz="11500" dirty="0">
+                <a:solidFill>
+                  <a:srgbClr val="A31515"/>
+                </a:solidFill>
+                <a:latin typeface="Consolas" panose="020B0609020204030204" pitchFamily="49" charset="0"/>
+              </a:rPr>
+              <a:t>"Hi"</a:t>
+            </a:r>
+            <a:r>
+              <a:rPr lang="en-US" sz="11500" dirty="0">
+                <a:solidFill>
+                  <a:srgbClr val="000000"/>
+                </a:solidFill>
+                <a:latin typeface="Consolas" panose="020B0609020204030204" pitchFamily="49" charset="0"/>
+              </a:rPr>
+              <a:t> === </a:t>
+            </a:r>
+            <a:r>
+              <a:rPr lang="en-US" sz="11500" dirty="0">
+                <a:solidFill>
+                  <a:srgbClr val="A31515"/>
+                </a:solidFill>
+                <a:latin typeface="Consolas" panose="020B0609020204030204" pitchFamily="49" charset="0"/>
+              </a:rPr>
+              <a:t>"Hi"</a:t>
+            </a:r>
+            <a:endParaRPr lang="en-US" sz="11500" dirty="0">
+              <a:solidFill>
+                <a:srgbClr val="000000"/>
+              </a:solidFill>
+              <a:latin typeface="Consolas" panose="020B0609020204030204" pitchFamily="49" charset="0"/>
+            </a:endParaRPr>
+          </a:p>
+        </p:txBody>
+      </p:sp>
+    </p:spTree>
+    <p:extLst>
+      <p:ext uri="{BB962C8B-B14F-4D97-AF65-F5344CB8AC3E}">
+        <p14:creationId xmlns:p14="http://schemas.microsoft.com/office/powerpoint/2010/main" val="768053228"/>
+      </p:ext>
+    </p:extLst>
+  </p:cSld>
+  <p:clrMapOvr>
+    <a:masterClrMapping/>
+  </p:clrMapOvr>
+  <p:transition>
+    <p:fade/>
+  </p:transition>
+</p:sld>
+</file>
+
+<file path=ppt/slides/slide21.xml><?xml version="1.0" encoding="utf-8"?>
+<p:sld xmlns:a="http://schemas.openxmlformats.org/drawingml/2006/main" xmlns:r="http://schemas.openxmlformats.org/officeDocument/2006/relationships" xmlns:p="http://schemas.openxmlformats.org/presentationml/2006/main">
+  <p:cSld>
+    <p:spTree>
+      <p:nvGrpSpPr>
+        <p:cNvPr id="1" name=""/>
+        <p:cNvGrpSpPr/>
+        <p:nvPr/>
+      </p:nvGrpSpPr>
+      <p:grpSpPr>
+        <a:xfrm>
+          <a:off x="0" y="0"/>
+          <a:ext cx="0" cy="0"/>
+          <a:chOff x="0" y="0"/>
+          <a:chExt cx="0" cy="0"/>
+        </a:xfrm>
+      </p:grpSpPr>
+      <p:sp>
+        <p:nvSpPr>
+          <p:cNvPr id="2" name="Title 1"/>
+          <p:cNvSpPr>
+            <a:spLocks noGrp="1"/>
+          </p:cNvSpPr>
+          <p:nvPr>
+            <p:ph type="title"/>
+          </p:nvPr>
+        </p:nvSpPr>
+        <p:spPr/>
+        <p:txBody>
+          <a:bodyPr/>
+          <a:lstStyle/>
+          <a:p>
+            <a:r>
+              <a:rPr lang="en-US" dirty="0"/>
+              <a:t>Mini-quiz: What’s the value?</a:t>
+            </a:r>
+          </a:p>
+        </p:txBody>
+      </p:sp>
+      <p:sp>
+        <p:nvSpPr>
+          <p:cNvPr id="3" name="Content Placeholder 2"/>
+          <p:cNvSpPr>
+            <a:spLocks noGrp="1"/>
+          </p:cNvSpPr>
+          <p:nvPr>
+            <p:ph idx="1"/>
+          </p:nvPr>
+        </p:nvSpPr>
+        <p:spPr/>
+        <p:txBody>
+          <a:bodyPr anchor="ctr">
+            <a:normAutofit/>
+          </a:bodyPr>
+          <a:lstStyle/>
+          <a:p>
+            <a:pPr marL="0" indent="0" algn="ctr">
+              <a:buNone/>
+            </a:pPr>
+            <a:r>
               <a:rPr lang="en-US" sz="7200" dirty="0">
                 <a:solidFill>
                   <a:srgbClr val="A31515"/>
@@ -40187,7 +40750,7 @@
 </p:sld>
 </file>
 
-<file path=ppt/slides/slide21.xml><?xml version="1.0" encoding="utf-8"?>
+<file path=ppt/slides/slide22.xml><?xml version="1.0" encoding="utf-8"?>
 <p:sld xmlns:a="http://schemas.openxmlformats.org/drawingml/2006/main" xmlns:r="http://schemas.openxmlformats.org/officeDocument/2006/relationships" xmlns:p="http://schemas.openxmlformats.org/presentationml/2006/main">
   <p:cSld>
     <p:spTree>
@@ -40470,7 +41033,7 @@
 </p:sld>
 </file>
 
-<file path=ppt/slides/slide22.xml><?xml version="1.0" encoding="utf-8"?>
+<file path=ppt/slides/slide23.xml><?xml version="1.0" encoding="utf-8"?>
 <p:sld xmlns:a="http://schemas.openxmlformats.org/drawingml/2006/main" xmlns:r="http://schemas.openxmlformats.org/officeDocument/2006/relationships" xmlns:p="http://schemas.openxmlformats.org/presentationml/2006/main">
   <p:cSld>
     <p:spTree>
@@ -40877,7 +41440,7 @@
 </p:sld>
 </file>
 
-<file path=ppt/slides/slide23.xml><?xml version="1.0" encoding="utf-8"?>
+<file path=ppt/slides/slide24.xml><?xml version="1.0" encoding="utf-8"?>
 <p:sld xmlns:a="http://schemas.openxmlformats.org/drawingml/2006/main" xmlns:r="http://schemas.openxmlformats.org/officeDocument/2006/relationships" xmlns:p="http://schemas.openxmlformats.org/presentationml/2006/main">
   <p:cSld>
     <p:spTree>

</xml_diff>

<commit_message>
Update gitbook 2023-08-29 17:41:07
</commit_message>
<xml_diff>
--- a/Conditionals/Conditionals.pptx
+++ b/Conditionals/Conditionals.pptx
@@ -5,7 +5,7 @@
     <p:sldMasterId id="2147483648" r:id="rId1"/>
   </p:sldMasterIdLst>
   <p:notesMasterIdLst>
-    <p:notesMasterId r:id="rId25"/>
+    <p:notesMasterId r:id="rId26"/>
   </p:notesMasterIdLst>
   <p:sldIdLst>
     <p:sldId id="258" r:id="rId2"/>
@@ -21,16 +21,17 @@
     <p:sldId id="310" r:id="rId12"/>
     <p:sldId id="311" r:id="rId13"/>
     <p:sldId id="312" r:id="rId14"/>
-    <p:sldId id="313" r:id="rId15"/>
-    <p:sldId id="306" r:id="rId16"/>
-    <p:sldId id="314" r:id="rId17"/>
-    <p:sldId id="325" r:id="rId18"/>
-    <p:sldId id="315" r:id="rId19"/>
-    <p:sldId id="316" r:id="rId20"/>
-    <p:sldId id="317" r:id="rId21"/>
-    <p:sldId id="318" r:id="rId22"/>
-    <p:sldId id="319" r:id="rId23"/>
-    <p:sldId id="326" r:id="rId24"/>
+    <p:sldId id="327" r:id="rId15"/>
+    <p:sldId id="313" r:id="rId16"/>
+    <p:sldId id="306" r:id="rId17"/>
+    <p:sldId id="314" r:id="rId18"/>
+    <p:sldId id="325" r:id="rId19"/>
+    <p:sldId id="315" r:id="rId20"/>
+    <p:sldId id="316" r:id="rId21"/>
+    <p:sldId id="317" r:id="rId22"/>
+    <p:sldId id="318" r:id="rId23"/>
+    <p:sldId id="319" r:id="rId24"/>
+    <p:sldId id="326" r:id="rId25"/>
   </p:sldIdLst>
   <p:sldSz cx="12192000" cy="6858000"/>
   <p:notesSz cx="6858000" cy="9144000"/>
@@ -230,7 +231,7 @@
           <a:p>
             <a:fld id="{19104133-B5B0-4351-8158-4F0E5EB1E2BF}" type="datetimeFigureOut">
               <a:rPr lang="en-US" smtClean="0"/>
-              <a:t>9/6/2022</a:t>
+              <a:t>8/29/2023</a:t>
             </a:fld>
             <a:endParaRPr lang="en-US"/>
           </a:p>
@@ -648,92 +649,19 @@
           <a:p>
             <a:r>
               <a:rPr lang="en-US" dirty="0"/>
-              <a:t>This image</a:t>
+              <a:t>Show the</a:t>
             </a:r>
             <a:r>
               <a:rPr lang="en-US" baseline="0" dirty="0"/>
-              <a:t> helps visualize</a:t>
+              <a:t> syntax of an else if and explain that the code in the body of the </a:t>
             </a:r>
             <a:r>
               <a:rPr lang="en-US" b="1" baseline="0" dirty="0"/>
-              <a:t> </a:t>
+              <a:t>else if</a:t>
             </a:r>
             <a:r>
               <a:rPr lang="en-US" b="0" baseline="0" dirty="0"/>
-              <a:t>the </a:t>
-            </a:r>
-            <a:r>
-              <a:rPr lang="en-US" b="1" baseline="0" dirty="0"/>
-              <a:t>else</a:t>
-            </a:r>
-            <a:r>
-              <a:rPr lang="en-US" b="0" baseline="0" dirty="0"/>
-              <a:t> clause process.</a:t>
-            </a:r>
-          </a:p>
-          <a:p>
-            <a:endParaRPr lang="en-US" b="0" baseline="0" dirty="0"/>
-          </a:p>
-          <a:p>
-            <a:r>
-              <a:rPr lang="en-US" b="0" baseline="0" dirty="0"/>
-              <a:t>The execution of the code will reach the </a:t>
-            </a:r>
-            <a:r>
-              <a:rPr lang="en-US" b="1" baseline="0" dirty="0"/>
-              <a:t>if </a:t>
-            </a:r>
-            <a:r>
-              <a:rPr lang="en-US" b="0" baseline="0" dirty="0"/>
-              <a:t>statement, and it will check the value of the </a:t>
-            </a:r>
-            <a:r>
-              <a:rPr lang="en-US" b="0" i="1" baseline="0" dirty="0" err="1"/>
-              <a:t>boolean_expression</a:t>
-            </a:r>
-            <a:r>
-              <a:rPr lang="en-US" b="0" i="0" baseline="0" dirty="0"/>
-              <a:t>. If it is </a:t>
-            </a:r>
-            <a:r>
-              <a:rPr lang="en-US" b="1" i="0" baseline="0" dirty="0"/>
-              <a:t>true</a:t>
-            </a:r>
-            <a:r>
-              <a:rPr lang="en-US" b="0" i="0" baseline="0" dirty="0"/>
-              <a:t>, it will execute </a:t>
-            </a:r>
-            <a:r>
-              <a:rPr lang="en-US" b="0" i="1" baseline="0" dirty="0"/>
-              <a:t>statement1</a:t>
-            </a:r>
-            <a:r>
-              <a:rPr lang="en-US" b="0" i="0" baseline="0" dirty="0"/>
-              <a:t> from the body of the </a:t>
-            </a:r>
-            <a:r>
-              <a:rPr lang="en-US" b="1" i="0" baseline="0" dirty="0"/>
-              <a:t>if</a:t>
-            </a:r>
-            <a:r>
-              <a:rPr lang="en-US" b="0" i="0" baseline="0" dirty="0"/>
-              <a:t> statement. If it is </a:t>
-            </a:r>
-            <a:r>
-              <a:rPr lang="en-US" b="1" i="0" baseline="0" dirty="0"/>
-              <a:t>false</a:t>
-            </a:r>
-            <a:r>
-              <a:rPr lang="en-US" b="0" i="0" baseline="0" dirty="0"/>
-              <a:t>, it will execute </a:t>
-            </a:r>
-            <a:r>
-              <a:rPr lang="en-US" b="0" i="1" baseline="0" dirty="0"/>
-              <a:t>statement2</a:t>
-            </a:r>
-            <a:r>
-              <a:rPr lang="en-US" b="0" i="0" baseline="0" dirty="0"/>
-              <a:t> from the body of the else clause. Then, either way, it will move on.</a:t>
+              <a:t> will run if the first condition is false, but the second is true</a:t>
             </a:r>
             <a:endParaRPr lang="en-US" dirty="0"/>
           </a:p>
@@ -765,7 +693,7 @@
     </p:spTree>
     <p:extLst>
       <p:ext uri="{BB962C8B-B14F-4D97-AF65-F5344CB8AC3E}">
-        <p14:creationId xmlns:p14="http://schemas.microsoft.com/office/powerpoint/2010/main" val="551849894"/>
+        <p14:creationId xmlns:p14="http://schemas.microsoft.com/office/powerpoint/2010/main" val="3235760147"/>
       </p:ext>
     </p:extLst>
   </p:cSld>
@@ -821,19 +749,19 @@
           <a:p>
             <a:r>
               <a:rPr lang="en-US" dirty="0"/>
-              <a:t>For the Repl,</a:t>
+              <a:t>This image</a:t>
             </a:r>
             <a:r>
               <a:rPr lang="en-US" baseline="0" dirty="0"/>
-              <a:t> note how the </a:t>
+              <a:t> helps visualize</a:t>
             </a:r>
             <a:r>
               <a:rPr lang="en-US" b="1" baseline="0" dirty="0"/>
-              <a:t>if</a:t>
+              <a:t> </a:t>
             </a:r>
             <a:r>
               <a:rPr lang="en-US" b="0" baseline="0" dirty="0"/>
-              <a:t> statement and </a:t>
+              <a:t>the </a:t>
             </a:r>
             <a:r>
               <a:rPr lang="en-US" b="1" baseline="0" dirty="0"/>
@@ -841,9 +769,74 @@
             </a:r>
             <a:r>
               <a:rPr lang="en-US" b="0" baseline="0" dirty="0"/>
-              <a:t> clause work. Change around the values, and setup the prompt as well. Possibly add some new code to see how it can affect the outcome. </a:t>
-            </a:r>
-            <a:endParaRPr lang="en-US" baseline="0" dirty="0"/>
+              <a:t> clause process.</a:t>
+            </a:r>
+          </a:p>
+          <a:p>
+            <a:endParaRPr lang="en-US" b="0" baseline="0" dirty="0"/>
+          </a:p>
+          <a:p>
+            <a:r>
+              <a:rPr lang="en-US" b="0" baseline="0" dirty="0"/>
+              <a:t>The execution of the code will reach the </a:t>
+            </a:r>
+            <a:r>
+              <a:rPr lang="en-US" b="1" baseline="0" dirty="0"/>
+              <a:t>if </a:t>
+            </a:r>
+            <a:r>
+              <a:rPr lang="en-US" b="0" baseline="0" dirty="0"/>
+              <a:t>statement, and it will check the value of the </a:t>
+            </a:r>
+            <a:r>
+              <a:rPr lang="en-US" b="0" i="1" baseline="0" dirty="0" err="1"/>
+              <a:t>boolean_expression</a:t>
+            </a:r>
+            <a:r>
+              <a:rPr lang="en-US" b="0" i="0" baseline="0" dirty="0"/>
+              <a:t>. If it is </a:t>
+            </a:r>
+            <a:r>
+              <a:rPr lang="en-US" b="1" i="0" baseline="0" dirty="0"/>
+              <a:t>true</a:t>
+            </a:r>
+            <a:r>
+              <a:rPr lang="en-US" b="0" i="0" baseline="0" dirty="0"/>
+              <a:t>, it will execute </a:t>
+            </a:r>
+            <a:r>
+              <a:rPr lang="en-US" b="0" i="1" baseline="0" dirty="0"/>
+              <a:t>statement1</a:t>
+            </a:r>
+            <a:r>
+              <a:rPr lang="en-US" b="0" i="0" baseline="0" dirty="0"/>
+              <a:t> from the body of the </a:t>
+            </a:r>
+            <a:r>
+              <a:rPr lang="en-US" b="1" i="0" baseline="0" dirty="0"/>
+              <a:t>if</a:t>
+            </a:r>
+            <a:r>
+              <a:rPr lang="en-US" b="0" i="0" baseline="0" dirty="0"/>
+              <a:t> statement. If it is </a:t>
+            </a:r>
+            <a:r>
+              <a:rPr lang="en-US" b="1" i="0" baseline="0" dirty="0"/>
+              <a:t>false</a:t>
+            </a:r>
+            <a:r>
+              <a:rPr lang="en-US" b="0" i="0" baseline="0" dirty="0"/>
+              <a:t>, it will execute </a:t>
+            </a:r>
+            <a:r>
+              <a:rPr lang="en-US" b="0" i="1" baseline="0" dirty="0"/>
+              <a:t>statement2</a:t>
+            </a:r>
+            <a:r>
+              <a:rPr lang="en-US" b="0" i="0" baseline="0" dirty="0"/>
+              <a:t> from the body of the else clause. Then, either way, it will move on.</a:t>
+            </a:r>
+            <a:endParaRPr lang="en-US" dirty="0"/>
           </a:p>
         </p:txBody>
       </p:sp>
@@ -873,7 +866,7 @@
     </p:spTree>
     <p:extLst>
       <p:ext uri="{BB962C8B-B14F-4D97-AF65-F5344CB8AC3E}">
-        <p14:creationId xmlns:p14="http://schemas.microsoft.com/office/powerpoint/2010/main" val="4123238520"/>
+        <p14:creationId xmlns:p14="http://schemas.microsoft.com/office/powerpoint/2010/main" val="551849894"/>
       </p:ext>
     </p:extLst>
   </p:cSld>
@@ -927,55 +920,31 @@
           <a:bodyPr/>
           <a:lstStyle/>
           <a:p>
-            <a:pPr marL="0" marR="0" lvl="0" indent="0" algn="l" defTabSz="914400" rtl="0" eaLnBrk="1" fontAlgn="auto" latinLnBrk="0" hangingPunct="1">
-              <a:lnSpc>
-                <a:spcPct val="100000"/>
-              </a:lnSpc>
-              <a:spcBef>
-                <a:spcPts val="0"/>
-              </a:spcBef>
-              <a:spcAft>
-                <a:spcPts val="0"/>
-              </a:spcAft>
-              <a:buClrTx/>
-              <a:buSzTx/>
-              <a:buFontTx/>
-              <a:buNone/>
-              <a:tabLst/>
-              <a:defRPr/>
-            </a:pPr>
             <a:r>
               <a:rPr lang="en-US" dirty="0"/>
-              <a:t>Ask the students to try</a:t>
+              <a:t>For the Repl,</a:t>
             </a:r>
             <a:r>
               <a:rPr lang="en-US" baseline="0" dirty="0"/>
-              <a:t> and think of the code as English. For example: </a:t>
-            </a:r>
-            <a:r>
-              <a:rPr lang="en-US" sz="1200" dirty="0">
-                <a:solidFill>
-                  <a:srgbClr val="E13FB4"/>
-                </a:solidFill>
-              </a:rPr>
-              <a:t>If my balance is less than five, say </a:t>
-            </a:r>
-            <a:r>
-              <a:rPr lang="en-US" sz="1200" baseline="0" dirty="0">
-                <a:solidFill>
-                  <a:srgbClr val="E13FB4"/>
-                </a:solidFill>
-              </a:rPr>
-              <a:t>“You do not have enough money</a:t>
-            </a:r>
-            <a:r>
-              <a:rPr lang="en-US" sz="1200" dirty="0">
-                <a:solidFill>
-                  <a:srgbClr val="E13FB4"/>
-                </a:solidFill>
-              </a:rPr>
-              <a:t>!”  Otherwise, say “You have enough money!”</a:t>
-            </a:r>
+              <a:t> note how the </a:t>
+            </a:r>
+            <a:r>
+              <a:rPr lang="en-US" b="1" baseline="0" dirty="0"/>
+              <a:t>if</a:t>
+            </a:r>
+            <a:r>
+              <a:rPr lang="en-US" b="0" baseline="0" dirty="0"/>
+              <a:t> statement and </a:t>
+            </a:r>
+            <a:r>
+              <a:rPr lang="en-US" b="1" baseline="0" dirty="0"/>
+              <a:t>else</a:t>
+            </a:r>
+            <a:r>
+              <a:rPr lang="en-US" b="0" baseline="0" dirty="0"/>
+              <a:t> clause work. Change around the values, and setup the prompt as well. Possibly add some new code to see how it can affect the outcome. </a:t>
+            </a:r>
+            <a:endParaRPr lang="en-US" baseline="0" dirty="0"/>
           </a:p>
         </p:txBody>
       </p:sp>
@@ -1005,7 +974,7 @@
     </p:spTree>
     <p:extLst>
       <p:ext uri="{BB962C8B-B14F-4D97-AF65-F5344CB8AC3E}">
-        <p14:creationId xmlns:p14="http://schemas.microsoft.com/office/powerpoint/2010/main" val="1694090019"/>
+        <p14:creationId xmlns:p14="http://schemas.microsoft.com/office/powerpoint/2010/main" val="4123238520"/>
       </p:ext>
     </p:extLst>
   </p:cSld>
@@ -1078,21 +1047,35 @@
             </a:pPr>
             <a:r>
               <a:rPr lang="en-US" dirty="0"/>
-              <a:t>For this</a:t>
+              <a:t>Ask the students to try</a:t>
             </a:r>
             <a:r>
               <a:rPr lang="en-US" baseline="0" dirty="0"/>
-              <a:t> section, go around the room and ask the students to answer the questions</a:t>
-            </a:r>
-            <a:endParaRPr lang="en-US" dirty="0"/>
-          </a:p>
-          <a:p>
-            <a:endParaRPr lang="en-US" dirty="0"/>
-          </a:p>
-          <a:p>
-            <a:r>
-              <a:rPr lang="en-US" dirty="0"/>
-              <a:t>false</a:t>
+              <a:t> and think of the code as English. For example: </a:t>
+            </a:r>
+            <a:r>
+              <a:rPr lang="en-US" sz="1200" dirty="0">
+                <a:solidFill>
+                  <a:srgbClr val="E13FB4"/>
+                </a:solidFill>
+              </a:rPr>
+              <a:t>If my balance is less than five, say </a:t>
+            </a:r>
+            <a:r>
+              <a:rPr lang="en-US" sz="1200" baseline="0" dirty="0">
+                <a:solidFill>
+                  <a:srgbClr val="E13FB4"/>
+                </a:solidFill>
+              </a:rPr>
+              <a:t>“You do not have enough money</a:t>
+            </a:r>
+            <a:r>
+              <a:rPr lang="en-US" sz="1200" dirty="0">
+                <a:solidFill>
+                  <a:srgbClr val="E13FB4"/>
+                </a:solidFill>
+              </a:rPr>
+              <a:t>!”  Otherwise, say “You have enough money!”</a:t>
             </a:r>
           </a:p>
         </p:txBody>
@@ -1114,7 +1097,7 @@
           <a:p>
             <a:fld id="{DEC8F7F9-57EC-49CF-9FCD-2B781E4B449F}" type="slidenum">
               <a:rPr lang="en-US" smtClean="0"/>
-              <a:t>18</a:t>
+              <a:t>17</a:t>
             </a:fld>
             <a:endParaRPr lang="en-US"/>
           </a:p>
@@ -1123,7 +1106,7 @@
     </p:spTree>
     <p:extLst>
       <p:ext uri="{BB962C8B-B14F-4D97-AF65-F5344CB8AC3E}">
-        <p14:creationId xmlns:p14="http://schemas.microsoft.com/office/powerpoint/2010/main" val="3147754652"/>
+        <p14:creationId xmlns:p14="http://schemas.microsoft.com/office/powerpoint/2010/main" val="1694090019"/>
       </p:ext>
     </p:extLst>
   </p:cSld>
@@ -1177,9 +1160,40 @@
           <a:bodyPr/>
           <a:lstStyle/>
           <a:p>
+            <a:pPr marL="0" marR="0" lvl="0" indent="0" algn="l" defTabSz="914400" rtl="0" eaLnBrk="1" fontAlgn="auto" latinLnBrk="0" hangingPunct="1">
+              <a:lnSpc>
+                <a:spcPct val="100000"/>
+              </a:lnSpc>
+              <a:spcBef>
+                <a:spcPts val="0"/>
+              </a:spcBef>
+              <a:spcAft>
+                <a:spcPts val="0"/>
+              </a:spcAft>
+              <a:buClrTx/>
+              <a:buSzTx/>
+              <a:buFontTx/>
+              <a:buNone/>
+              <a:tabLst/>
+              <a:defRPr/>
+            </a:pPr>
             <a:r>
               <a:rPr lang="en-US" dirty="0"/>
-              <a:t>true</a:t>
+              <a:t>For this</a:t>
+            </a:r>
+            <a:r>
+              <a:rPr lang="en-US" baseline="0" dirty="0"/>
+              <a:t> section, go around the room and ask the students to answer the questions</a:t>
+            </a:r>
+            <a:endParaRPr lang="en-US" dirty="0"/>
+          </a:p>
+          <a:p>
+            <a:endParaRPr lang="en-US" dirty="0"/>
+          </a:p>
+          <a:p>
+            <a:r>
+              <a:rPr lang="en-US" dirty="0"/>
+              <a:t>false</a:t>
             </a:r>
           </a:p>
         </p:txBody>
@@ -1210,7 +1224,7 @@
     </p:spTree>
     <p:extLst>
       <p:ext uri="{BB962C8B-B14F-4D97-AF65-F5344CB8AC3E}">
-        <p14:creationId xmlns:p14="http://schemas.microsoft.com/office/powerpoint/2010/main" val="3909205565"/>
+        <p14:creationId xmlns:p14="http://schemas.microsoft.com/office/powerpoint/2010/main" val="3147754652"/>
       </p:ext>
     </p:extLst>
   </p:cSld>
@@ -1266,7 +1280,7 @@
           <a:p>
             <a:r>
               <a:rPr lang="en-US" dirty="0"/>
-              <a:t>false</a:t>
+              <a:t>true</a:t>
             </a:r>
           </a:p>
         </p:txBody>
@@ -1297,7 +1311,7 @@
     </p:spTree>
     <p:extLst>
       <p:ext uri="{BB962C8B-B14F-4D97-AF65-F5344CB8AC3E}">
-        <p14:creationId xmlns:p14="http://schemas.microsoft.com/office/powerpoint/2010/main" val="23014528"/>
+        <p14:creationId xmlns:p14="http://schemas.microsoft.com/office/powerpoint/2010/main" val="3909205565"/>
       </p:ext>
     </p:extLst>
   </p:cSld>
@@ -1353,7 +1367,7 @@
           <a:p>
             <a:r>
               <a:rPr lang="en-US" dirty="0"/>
-              <a:t>true</a:t>
+              <a:t>false</a:t>
             </a:r>
           </a:p>
         </p:txBody>
@@ -1384,7 +1398,7 @@
     </p:spTree>
     <p:extLst>
       <p:ext uri="{BB962C8B-B14F-4D97-AF65-F5344CB8AC3E}">
-        <p14:creationId xmlns:p14="http://schemas.microsoft.com/office/powerpoint/2010/main" val="991626845"/>
+        <p14:creationId xmlns:p14="http://schemas.microsoft.com/office/powerpoint/2010/main" val="23014528"/>
       </p:ext>
     </p:extLst>
   </p:cSld>
@@ -1440,15 +1454,7 @@
           <a:p>
             <a:r>
               <a:rPr lang="en-US" dirty="0"/>
-              <a:t>“</a:t>
-            </a:r>
-            <a:r>
-              <a:rPr lang="en-US" dirty="0" err="1"/>
-              <a:t>myBalance</a:t>
-            </a:r>
-            <a:r>
-              <a:rPr lang="en-US" dirty="0"/>
-              <a:t> is 14 or more!”</a:t>
+              <a:t>true</a:t>
             </a:r>
           </a:p>
         </p:txBody>
@@ -1471,6 +1477,101 @@
             <a:fld id="{DEC8F7F9-57EC-49CF-9FCD-2B781E4B449F}" type="slidenum">
               <a:rPr lang="en-US" smtClean="0"/>
               <a:t>22</a:t>
+            </a:fld>
+            <a:endParaRPr lang="en-US"/>
+          </a:p>
+        </p:txBody>
+      </p:sp>
+    </p:spTree>
+    <p:extLst>
+      <p:ext uri="{BB962C8B-B14F-4D97-AF65-F5344CB8AC3E}">
+        <p14:creationId xmlns:p14="http://schemas.microsoft.com/office/powerpoint/2010/main" val="991626845"/>
+      </p:ext>
+    </p:extLst>
+  </p:cSld>
+  <p:clrMapOvr>
+    <a:masterClrMapping/>
+  </p:clrMapOvr>
+</p:notes>
+</file>
+
+<file path=ppt/notesSlides/notesSlide18.xml><?xml version="1.0" encoding="utf-8"?>
+<p:notes xmlns:a="http://schemas.openxmlformats.org/drawingml/2006/main" xmlns:r="http://schemas.openxmlformats.org/officeDocument/2006/relationships" xmlns:p="http://schemas.openxmlformats.org/presentationml/2006/main">
+  <p:cSld>
+    <p:spTree>
+      <p:nvGrpSpPr>
+        <p:cNvPr id="1" name=""/>
+        <p:cNvGrpSpPr/>
+        <p:nvPr/>
+      </p:nvGrpSpPr>
+      <p:grpSpPr>
+        <a:xfrm>
+          <a:off x="0" y="0"/>
+          <a:ext cx="0" cy="0"/>
+          <a:chOff x="0" y="0"/>
+          <a:chExt cx="0" cy="0"/>
+        </a:xfrm>
+      </p:grpSpPr>
+      <p:sp>
+        <p:nvSpPr>
+          <p:cNvPr id="2" name="Slide Image Placeholder 1"/>
+          <p:cNvSpPr>
+            <a:spLocks noGrp="1" noRot="1" noChangeAspect="1"/>
+          </p:cNvSpPr>
+          <p:nvPr>
+            <p:ph type="sldImg"/>
+          </p:nvPr>
+        </p:nvSpPr>
+        <p:spPr/>
+      </p:sp>
+      <p:sp>
+        <p:nvSpPr>
+          <p:cNvPr id="3" name="Notes Placeholder 2"/>
+          <p:cNvSpPr>
+            <a:spLocks noGrp="1"/>
+          </p:cNvSpPr>
+          <p:nvPr>
+            <p:ph type="body" idx="1"/>
+          </p:nvPr>
+        </p:nvSpPr>
+        <p:spPr/>
+        <p:txBody>
+          <a:bodyPr/>
+          <a:lstStyle/>
+          <a:p>
+            <a:r>
+              <a:rPr lang="en-US" dirty="0"/>
+              <a:t>“</a:t>
+            </a:r>
+            <a:r>
+              <a:rPr lang="en-US" dirty="0" err="1"/>
+              <a:t>myBalance</a:t>
+            </a:r>
+            <a:r>
+              <a:rPr lang="en-US" dirty="0"/>
+              <a:t> is 14 or more!”</a:t>
+            </a:r>
+          </a:p>
+        </p:txBody>
+      </p:sp>
+      <p:sp>
+        <p:nvSpPr>
+          <p:cNvPr id="4" name="Slide Number Placeholder 3"/>
+          <p:cNvSpPr>
+            <a:spLocks noGrp="1"/>
+          </p:cNvSpPr>
+          <p:nvPr>
+            <p:ph type="sldNum" sz="quarter" idx="10"/>
+          </p:nvPr>
+        </p:nvSpPr>
+        <p:spPr/>
+        <p:txBody>
+          <a:bodyPr/>
+          <a:lstStyle/>
+          <a:p>
+            <a:fld id="{DEC8F7F9-57EC-49CF-9FCD-2B781E4B449F}" type="slidenum">
+              <a:rPr lang="en-US" smtClean="0"/>
+              <a:t>23</a:t>
             </a:fld>
             <a:endParaRPr lang="en-US"/>
           </a:p>
@@ -2845,7 +2946,7 @@
             <a:fld id="{1C2D31DE-C454-491C-B5C3-F097855E3DF7}" type="datetime4">
               <a:rPr lang="en-US" smtClean="0"/>
               <a:pPr/>
-              <a:t>September 6, 2022</a:t>
+              <a:t>August 29, 2023</a:t>
             </a:fld>
             <a:endParaRPr lang="en-US" dirty="0"/>
           </a:p>
@@ -6237,7 +6338,7 @@
           <a:p>
             <a:fld id="{5958763E-B898-436D-883D-03711491D54A}" type="datetimeFigureOut">
               <a:rPr lang="en-US" smtClean="0"/>
-              <a:t>9/6/2022</a:t>
+              <a:t>8/29/2023</a:t>
             </a:fld>
             <a:endParaRPr lang="en-US"/>
           </a:p>
@@ -6430,7 +6531,7 @@
           <a:p>
             <a:fld id="{5958763E-B898-436D-883D-03711491D54A}" type="datetimeFigureOut">
               <a:rPr lang="en-US" smtClean="0"/>
-              <a:t>9/6/2022</a:t>
+              <a:t>8/29/2023</a:t>
             </a:fld>
             <a:endParaRPr lang="en-US"/>
           </a:p>
@@ -6680,7 +6781,7 @@
           <a:p>
             <a:fld id="{5958763E-B898-436D-883D-03711491D54A}" type="datetimeFigureOut">
               <a:rPr lang="en-US" smtClean="0"/>
-              <a:t>9/6/2022</a:t>
+              <a:t>8/29/2023</a:t>
             </a:fld>
             <a:endParaRPr lang="en-US"/>
           </a:p>
@@ -7028,7 +7129,7 @@
           <a:p>
             <a:fld id="{5958763E-B898-436D-883D-03711491D54A}" type="datetimeFigureOut">
               <a:rPr lang="en-US" smtClean="0"/>
-              <a:t>9/6/2022</a:t>
+              <a:t>8/29/2023</a:t>
             </a:fld>
             <a:endParaRPr lang="en-US"/>
           </a:p>
@@ -7444,7 +7545,7 @@
           <a:p>
             <a:fld id="{5958763E-B898-436D-883D-03711491D54A}" type="datetimeFigureOut">
               <a:rPr lang="en-US" smtClean="0"/>
-              <a:t>9/6/2022</a:t>
+              <a:t>8/29/2023</a:t>
             </a:fld>
             <a:endParaRPr lang="en-US"/>
           </a:p>
@@ -7945,7 +8046,7 @@
           <a:p>
             <a:fld id="{5958763E-B898-436D-883D-03711491D54A}" type="datetimeFigureOut">
               <a:rPr lang="en-US" smtClean="0"/>
-              <a:t>9/6/2022</a:t>
+              <a:t>8/29/2023</a:t>
             </a:fld>
             <a:endParaRPr lang="en-US"/>
           </a:p>
@@ -8396,7 +8497,7 @@
           <a:p>
             <a:fld id="{5958763E-B898-436D-883D-03711491D54A}" type="datetimeFigureOut">
               <a:rPr lang="en-US" smtClean="0"/>
-              <a:t>9/6/2022</a:t>
+              <a:t>8/29/2023</a:t>
             </a:fld>
             <a:endParaRPr lang="en-US"/>
           </a:p>
@@ -9007,7 +9108,7 @@
           <a:p>
             <a:fld id="{5958763E-B898-436D-883D-03711491D54A}" type="datetimeFigureOut">
               <a:rPr lang="en-US" smtClean="0"/>
-              <a:t>9/6/2022</a:t>
+              <a:t>8/29/2023</a:t>
             </a:fld>
             <a:endParaRPr lang="en-US"/>
           </a:p>
@@ -9778,7 +9879,7 @@
           <a:p>
             <a:fld id="{5958763E-B898-436D-883D-03711491D54A}" type="datetimeFigureOut">
               <a:rPr lang="en-US" smtClean="0"/>
-              <a:t>9/6/2022</a:t>
+              <a:t>8/29/2023</a:t>
             </a:fld>
             <a:endParaRPr lang="en-US"/>
           </a:p>
@@ -9882,7 +9983,7 @@
           <a:p>
             <a:fld id="{5958763E-B898-436D-883D-03711491D54A}" type="datetimeFigureOut">
               <a:rPr lang="en-US" smtClean="0"/>
-              <a:t>9/6/2022</a:t>
+              <a:t>8/29/2023</a:t>
             </a:fld>
             <a:endParaRPr lang="en-US"/>
           </a:p>
@@ -10209,7 +10310,7 @@
             <a:fld id="{1C2D31DE-C454-491C-B5C3-F097855E3DF7}" type="datetime4">
               <a:rPr lang="en-US" smtClean="0"/>
               <a:pPr/>
-              <a:t>September 6, 2022</a:t>
+              <a:t>August 29, 2023</a:t>
             </a:fld>
             <a:endParaRPr lang="en-US" dirty="0"/>
           </a:p>
@@ -13361,7 +13462,7 @@
           <a:p>
             <a:fld id="{5958763E-B898-436D-883D-03711491D54A}" type="datetimeFigureOut">
               <a:rPr lang="en-US" smtClean="0"/>
-              <a:t>9/6/2022</a:t>
+              <a:t>8/29/2023</a:t>
             </a:fld>
             <a:endParaRPr lang="en-US"/>
           </a:p>
@@ -13485,7 +13586,7 @@
           <a:p>
             <a:fld id="{5958763E-B898-436D-883D-03711491D54A}" type="datetimeFigureOut">
               <a:rPr lang="en-US" smtClean="0"/>
-              <a:t>9/6/2022</a:t>
+              <a:t>8/29/2023</a:t>
             </a:fld>
             <a:endParaRPr lang="en-US"/>
           </a:p>
@@ -13609,7 +13710,7 @@
           <a:p>
             <a:fld id="{5958763E-B898-436D-883D-03711491D54A}" type="datetimeFigureOut">
               <a:rPr lang="en-US" smtClean="0"/>
-              <a:t>9/6/2022</a:t>
+              <a:t>8/29/2023</a:t>
             </a:fld>
             <a:endParaRPr lang="en-US"/>
           </a:p>
@@ -13733,7 +13834,7 @@
           <a:p>
             <a:fld id="{5958763E-B898-436D-883D-03711491D54A}" type="datetimeFigureOut">
               <a:rPr lang="en-US" smtClean="0"/>
-              <a:t>9/6/2022</a:t>
+              <a:t>8/29/2023</a:t>
             </a:fld>
             <a:endParaRPr lang="en-US"/>
           </a:p>
@@ -13857,7 +13958,7 @@
           <a:p>
             <a:fld id="{5958763E-B898-436D-883D-03711491D54A}" type="datetimeFigureOut">
               <a:rPr lang="en-US" smtClean="0"/>
-              <a:t>9/6/2022</a:t>
+              <a:t>8/29/2023</a:t>
             </a:fld>
             <a:endParaRPr lang="en-US"/>
           </a:p>
@@ -13981,7 +14082,7 @@
           <a:p>
             <a:fld id="{5958763E-B898-436D-883D-03711491D54A}" type="datetimeFigureOut">
               <a:rPr lang="en-US" smtClean="0"/>
-              <a:t>9/6/2022</a:t>
+              <a:t>8/29/2023</a:t>
             </a:fld>
             <a:endParaRPr lang="en-US"/>
           </a:p>
@@ -14105,7 +14206,7 @@
           <a:p>
             <a:fld id="{5958763E-B898-436D-883D-03711491D54A}" type="datetimeFigureOut">
               <a:rPr lang="en-US" smtClean="0"/>
-              <a:t>9/6/2022</a:t>
+              <a:t>8/29/2023</a:t>
             </a:fld>
             <a:endParaRPr lang="en-US"/>
           </a:p>
@@ -14229,7 +14330,7 @@
           <a:p>
             <a:fld id="{5958763E-B898-436D-883D-03711491D54A}" type="datetimeFigureOut">
               <a:rPr lang="en-US" smtClean="0"/>
-              <a:t>9/6/2022</a:t>
+              <a:t>8/29/2023</a:t>
             </a:fld>
             <a:endParaRPr lang="en-US"/>
           </a:p>
@@ -14362,7 +14463,7 @@
           <a:p>
             <a:fld id="{5958763E-B898-436D-883D-03711491D54A}" type="datetimeFigureOut">
               <a:rPr lang="en-US" smtClean="0"/>
-              <a:t>9/6/2022</a:t>
+              <a:t>8/29/2023</a:t>
             </a:fld>
             <a:endParaRPr lang="en-US"/>
           </a:p>
@@ -17701,7 +17802,7 @@
             <a:fld id="{1C2D31DE-C454-491C-B5C3-F097855E3DF7}" type="datetime4">
               <a:rPr lang="en-US" smtClean="0"/>
               <a:pPr/>
-              <a:t>September 6, 2022</a:t>
+              <a:t>August 29, 2023</a:t>
             </a:fld>
             <a:endParaRPr lang="en-US" dirty="0"/>
           </a:p>
@@ -29937,7 +30038,7 @@
           <a:p>
             <a:fld id="{5958763E-B898-436D-883D-03711491D54A}" type="datetimeFigureOut">
               <a:rPr lang="en-US" smtClean="0"/>
-              <a:t>9/6/2022</a:t>
+              <a:t>8/29/2023</a:t>
             </a:fld>
             <a:endParaRPr lang="en-US"/>
           </a:p>
@@ -30339,7 +30440,7 @@
           <a:p>
             <a:fld id="{5958763E-B898-436D-883D-03711491D54A}" type="datetimeFigureOut">
               <a:rPr lang="en-US" smtClean="0"/>
-              <a:t>9/6/2022</a:t>
+              <a:t>8/29/2023</a:t>
             </a:fld>
             <a:endParaRPr lang="en-US"/>
           </a:p>
@@ -30633,7 +30734,7 @@
           <a:p>
             <a:fld id="{5958763E-B898-436D-883D-03711491D54A}" type="datetimeFigureOut">
               <a:rPr lang="en-US" smtClean="0"/>
-              <a:t>9/6/2022</a:t>
+              <a:t>8/29/2023</a:t>
             </a:fld>
             <a:endParaRPr lang="en-US"/>
           </a:p>
@@ -30834,7 +30935,7 @@
           <a:p>
             <a:fld id="{5958763E-B898-436D-883D-03711491D54A}" type="datetimeFigureOut">
               <a:rPr lang="en-US" smtClean="0"/>
-              <a:t>9/6/2022</a:t>
+              <a:t>8/29/2023</a:t>
             </a:fld>
             <a:endParaRPr lang="en-US"/>
           </a:p>
@@ -31095,7 +31196,7 @@
           <a:p>
             <a:fld id="{5958763E-B898-436D-883D-03711491D54A}" type="datetimeFigureOut">
               <a:rPr lang="en-US" smtClean="0"/>
-              <a:t>9/6/2022</a:t>
+              <a:t>8/29/2023</a:t>
             </a:fld>
             <a:endParaRPr lang="en-US"/>
           </a:p>
@@ -31603,7 +31704,7 @@
           <a:p>
             <a:fld id="{5958763E-B898-436D-883D-03711491D54A}" type="datetimeFigureOut">
               <a:rPr lang="en-US" smtClean="0"/>
-              <a:t>9/6/2022</a:t>
+              <a:t>8/29/2023</a:t>
             </a:fld>
             <a:endParaRPr lang="en-US"/>
           </a:p>
@@ -32082,7 +32183,7 @@
           <a:p>
             <a:fld id="{5958763E-B898-436D-883D-03711491D54A}" type="datetimeFigureOut">
               <a:rPr lang="en-US" smtClean="0"/>
-              <a:t>9/6/2022</a:t>
+              <a:t>8/29/2023</a:t>
             </a:fld>
             <a:endParaRPr lang="en-US"/>
           </a:p>
@@ -32901,7 +33002,7 @@
           <a:p>
             <a:fld id="{5958763E-B898-436D-883D-03711491D54A}" type="datetimeFigureOut">
               <a:rPr lang="en-US" smtClean="0"/>
-              <a:t>9/6/2022</a:t>
+              <a:t>8/29/2023</a:t>
             </a:fld>
             <a:endParaRPr lang="en-US"/>
           </a:p>
@@ -33102,7 +33203,7 @@
           <a:p>
             <a:fld id="{5958763E-B898-436D-883D-03711491D54A}" type="datetimeFigureOut">
               <a:rPr lang="en-US" smtClean="0"/>
-              <a:t>9/6/2022</a:t>
+              <a:t>8/29/2023</a:t>
             </a:fld>
             <a:endParaRPr lang="en-US"/>
           </a:p>
@@ -33437,7 +33538,7 @@
           <a:p>
             <a:fld id="{5958763E-B898-436D-883D-03711491D54A}" type="datetimeFigureOut">
               <a:rPr lang="en-US" smtClean="0"/>
-              <a:t>9/6/2022</a:t>
+              <a:t>8/29/2023</a:t>
             </a:fld>
             <a:endParaRPr lang="en-US"/>
           </a:p>
@@ -33667,7 +33768,7 @@
           <a:p>
             <a:fld id="{5958763E-B898-436D-883D-03711491D54A}" type="datetimeFigureOut">
               <a:rPr lang="en-US" smtClean="0"/>
-              <a:t>9/6/2022</a:t>
+              <a:t>8/29/2023</a:t>
             </a:fld>
             <a:endParaRPr lang="en-US"/>
           </a:p>
@@ -33911,7 +34012,7 @@
           <a:p>
             <a:fld id="{5958763E-B898-436D-883D-03711491D54A}" type="datetimeFigureOut">
               <a:rPr lang="en-US" smtClean="0"/>
-              <a:t>9/6/2022</a:t>
+              <a:t>8/29/2023</a:t>
             </a:fld>
             <a:endParaRPr lang="en-US"/>
           </a:p>
@@ -39142,6 +39243,468 @@
           <a:lstStyle/>
           <a:p>
             <a:r>
+              <a:rPr lang="en-US" sz="4000" cap="none">
+                <a:solidFill>
+                  <a:schemeClr val="accent1">
+                    <a:lumMod val="50000"/>
+                  </a:schemeClr>
+                </a:solidFill>
+                <a:latin typeface="Consolas" panose="020B0609020204030204" pitchFamily="49" charset="0"/>
+              </a:rPr>
+              <a:t>else if</a:t>
+            </a:r>
+            <a:endParaRPr lang="en-US" dirty="0"/>
+          </a:p>
+        </p:txBody>
+      </p:sp>
+      <p:sp>
+        <p:nvSpPr>
+          <p:cNvPr id="3" name="Content Placeholder 2"/>
+          <p:cNvSpPr>
+            <a:spLocks noGrp="1"/>
+          </p:cNvSpPr>
+          <p:nvPr>
+            <p:ph idx="1"/>
+          </p:nvPr>
+        </p:nvSpPr>
+        <p:spPr/>
+        <p:txBody>
+          <a:bodyPr>
+            <a:normAutofit/>
+          </a:bodyPr>
+          <a:lstStyle/>
+          <a:p>
+            <a:pPr marL="0" indent="0">
+              <a:buNone/>
+            </a:pPr>
+            <a:r>
+              <a:rPr lang="en-US" sz="4800" dirty="0">
+                <a:solidFill>
+                  <a:srgbClr val="0000CD"/>
+                </a:solidFill>
+                <a:latin typeface="Consolas" panose="020B0609020204030204" pitchFamily="49" charset="0"/>
+              </a:rPr>
+              <a:t>if</a:t>
+            </a:r>
+            <a:r>
+              <a:rPr lang="en-US" sz="4800" dirty="0">
+                <a:solidFill>
+                  <a:srgbClr val="000000"/>
+                </a:solidFill>
+                <a:latin typeface="Consolas" panose="020B0609020204030204" pitchFamily="49" charset="0"/>
+              </a:rPr>
+              <a:t> (time &lt; </a:t>
+            </a:r>
+            <a:r>
+              <a:rPr lang="en-US" sz="4800" dirty="0">
+                <a:solidFill>
+                  <a:srgbClr val="FF0000"/>
+                </a:solidFill>
+                <a:latin typeface="Consolas" panose="020B0609020204030204" pitchFamily="49" charset="0"/>
+              </a:rPr>
+              <a:t>10</a:t>
+            </a:r>
+            <a:r>
+              <a:rPr lang="en-US" sz="4800" dirty="0">
+                <a:solidFill>
+                  <a:srgbClr val="000000"/>
+                </a:solidFill>
+                <a:latin typeface="Consolas" panose="020B0609020204030204" pitchFamily="49" charset="0"/>
+              </a:rPr>
+              <a:t>) {</a:t>
+            </a:r>
+            <a:br>
+              <a:rPr lang="en-US" sz="4800" dirty="0">
+                <a:latin typeface="Consolas" panose="020B0609020204030204" pitchFamily="49" charset="0"/>
+              </a:rPr>
+            </a:br>
+            <a:r>
+              <a:rPr lang="en-US" sz="4800" dirty="0">
+                <a:solidFill>
+                  <a:srgbClr val="000000"/>
+                </a:solidFill>
+                <a:latin typeface="Consolas" panose="020B0609020204030204" pitchFamily="49" charset="0"/>
+              </a:rPr>
+              <a:t>	</a:t>
+            </a:r>
+            <a:r>
+              <a:rPr lang="en-US" sz="4400" dirty="0">
+                <a:solidFill>
+                  <a:srgbClr val="000000"/>
+                </a:solidFill>
+                <a:latin typeface="Consolas" panose="020B0609020204030204" pitchFamily="49" charset="0"/>
+              </a:rPr>
+              <a:t>alert(</a:t>
+            </a:r>
+            <a:r>
+              <a:rPr lang="en-US" sz="4400" dirty="0">
+                <a:solidFill>
+                  <a:srgbClr val="A52A2A"/>
+                </a:solidFill>
+                <a:latin typeface="Consolas" panose="020B0609020204030204" pitchFamily="49" charset="0"/>
+              </a:rPr>
+              <a:t>"Good morning"</a:t>
+            </a:r>
+            <a:r>
+              <a:rPr lang="en-US" sz="4400" dirty="0">
+                <a:solidFill>
+                  <a:srgbClr val="000000"/>
+                </a:solidFill>
+                <a:latin typeface="Consolas" panose="020B0609020204030204" pitchFamily="49" charset="0"/>
+              </a:rPr>
+              <a:t>);</a:t>
+            </a:r>
+            <a:br>
+              <a:rPr lang="en-US" sz="4800" dirty="0">
+                <a:latin typeface="Consolas" panose="020B0609020204030204" pitchFamily="49" charset="0"/>
+              </a:rPr>
+            </a:br>
+            <a:r>
+              <a:rPr lang="en-US" sz="4800" dirty="0">
+                <a:solidFill>
+                  <a:srgbClr val="000000"/>
+                </a:solidFill>
+                <a:latin typeface="Consolas" panose="020B0609020204030204" pitchFamily="49" charset="0"/>
+              </a:rPr>
+              <a:t>} </a:t>
+            </a:r>
+            <a:r>
+              <a:rPr lang="en-US" sz="4800" b="1" dirty="0">
+                <a:solidFill>
+                  <a:srgbClr val="0000CD"/>
+                </a:solidFill>
+                <a:latin typeface="Consolas" panose="020B0609020204030204" pitchFamily="49" charset="0"/>
+              </a:rPr>
+              <a:t>else</a:t>
+            </a:r>
+            <a:r>
+              <a:rPr lang="en-US" sz="4800" b="1" dirty="0">
+                <a:solidFill>
+                  <a:srgbClr val="000000"/>
+                </a:solidFill>
+                <a:latin typeface="Consolas" panose="020B0609020204030204" pitchFamily="49" charset="0"/>
+              </a:rPr>
+              <a:t> </a:t>
+            </a:r>
+            <a:r>
+              <a:rPr lang="en-US" sz="4800" b="1" dirty="0">
+                <a:solidFill>
+                  <a:srgbClr val="0000CD"/>
+                </a:solidFill>
+                <a:latin typeface="Consolas" panose="020B0609020204030204" pitchFamily="49" charset="0"/>
+              </a:rPr>
+              <a:t>if</a:t>
+            </a:r>
+            <a:r>
+              <a:rPr lang="en-US" sz="4800" b="1" dirty="0">
+                <a:solidFill>
+                  <a:srgbClr val="000000"/>
+                </a:solidFill>
+                <a:latin typeface="Consolas" panose="020B0609020204030204" pitchFamily="49" charset="0"/>
+              </a:rPr>
+              <a:t> (time &lt; </a:t>
+            </a:r>
+            <a:r>
+              <a:rPr lang="en-US" sz="4800" b="1" dirty="0">
+                <a:solidFill>
+                  <a:srgbClr val="FF0000"/>
+                </a:solidFill>
+                <a:latin typeface="Consolas" panose="020B0609020204030204" pitchFamily="49" charset="0"/>
+              </a:rPr>
+              <a:t>20</a:t>
+            </a:r>
+            <a:r>
+              <a:rPr lang="en-US" sz="4800" b="1" dirty="0">
+                <a:solidFill>
+                  <a:srgbClr val="000000"/>
+                </a:solidFill>
+                <a:latin typeface="Consolas" panose="020B0609020204030204" pitchFamily="49" charset="0"/>
+              </a:rPr>
+              <a:t>)</a:t>
+            </a:r>
+            <a:r>
+              <a:rPr lang="en-US" sz="4800" dirty="0">
+                <a:solidFill>
+                  <a:srgbClr val="000000"/>
+                </a:solidFill>
+                <a:latin typeface="Consolas" panose="020B0609020204030204" pitchFamily="49" charset="0"/>
+              </a:rPr>
+              <a:t> {</a:t>
+            </a:r>
+            <a:br>
+              <a:rPr lang="en-US" sz="4800" dirty="0">
+                <a:latin typeface="Consolas" panose="020B0609020204030204" pitchFamily="49" charset="0"/>
+              </a:rPr>
+            </a:br>
+            <a:r>
+              <a:rPr lang="en-US" sz="4800" dirty="0">
+                <a:solidFill>
+                  <a:srgbClr val="000000"/>
+                </a:solidFill>
+                <a:latin typeface="Consolas" panose="020B0609020204030204" pitchFamily="49" charset="0"/>
+              </a:rPr>
+              <a:t>	</a:t>
+            </a:r>
+            <a:r>
+              <a:rPr lang="en-US" sz="4400" dirty="0">
+                <a:solidFill>
+                  <a:srgbClr val="000000"/>
+                </a:solidFill>
+                <a:latin typeface="Consolas" panose="020B0609020204030204" pitchFamily="49" charset="0"/>
+              </a:rPr>
+              <a:t>alert(</a:t>
+            </a:r>
+            <a:r>
+              <a:rPr lang="en-US" sz="4400" dirty="0">
+                <a:solidFill>
+                  <a:srgbClr val="A52A2A"/>
+                </a:solidFill>
+                <a:latin typeface="Consolas" panose="020B0609020204030204" pitchFamily="49" charset="0"/>
+              </a:rPr>
+              <a:t>"Good day"</a:t>
+            </a:r>
+            <a:r>
+              <a:rPr lang="en-US" sz="4400" dirty="0">
+                <a:solidFill>
+                  <a:srgbClr val="000000"/>
+                </a:solidFill>
+                <a:latin typeface="Consolas" panose="020B0609020204030204" pitchFamily="49" charset="0"/>
+              </a:rPr>
+              <a:t>);</a:t>
+            </a:r>
+            <a:br>
+              <a:rPr lang="en-US" sz="4800" dirty="0">
+                <a:latin typeface="Consolas" panose="020B0609020204030204" pitchFamily="49" charset="0"/>
+              </a:rPr>
+            </a:br>
+            <a:r>
+              <a:rPr lang="en-US" sz="4800" dirty="0">
+                <a:solidFill>
+                  <a:srgbClr val="000000"/>
+                </a:solidFill>
+                <a:latin typeface="Consolas" panose="020B0609020204030204" pitchFamily="49" charset="0"/>
+              </a:rPr>
+              <a:t>} </a:t>
+            </a:r>
+            <a:r>
+              <a:rPr lang="en-US" sz="4800" dirty="0">
+                <a:solidFill>
+                  <a:srgbClr val="0000CD"/>
+                </a:solidFill>
+                <a:latin typeface="Consolas" panose="020B0609020204030204" pitchFamily="49" charset="0"/>
+              </a:rPr>
+              <a:t>else</a:t>
+            </a:r>
+            <a:r>
+              <a:rPr lang="en-US" sz="4800" dirty="0">
+                <a:solidFill>
+                  <a:srgbClr val="000000"/>
+                </a:solidFill>
+                <a:latin typeface="Consolas" panose="020B0609020204030204" pitchFamily="49" charset="0"/>
+              </a:rPr>
+              <a:t> {</a:t>
+            </a:r>
+            <a:br>
+              <a:rPr lang="en-US" sz="4800" dirty="0">
+                <a:latin typeface="Consolas" panose="020B0609020204030204" pitchFamily="49" charset="0"/>
+              </a:rPr>
+            </a:br>
+            <a:r>
+              <a:rPr lang="en-US" sz="4800" dirty="0">
+                <a:solidFill>
+                  <a:srgbClr val="000000"/>
+                </a:solidFill>
+                <a:latin typeface="Consolas" panose="020B0609020204030204" pitchFamily="49" charset="0"/>
+              </a:rPr>
+              <a:t>	</a:t>
+            </a:r>
+            <a:r>
+              <a:rPr lang="en-US" sz="4400" dirty="0">
+                <a:solidFill>
+                  <a:srgbClr val="000000"/>
+                </a:solidFill>
+                <a:latin typeface="Consolas" panose="020B0609020204030204" pitchFamily="49" charset="0"/>
+              </a:rPr>
+              <a:t>alert(</a:t>
+            </a:r>
+            <a:r>
+              <a:rPr lang="en-US" sz="4400" dirty="0">
+                <a:solidFill>
+                  <a:srgbClr val="A52A2A"/>
+                </a:solidFill>
+                <a:latin typeface="Consolas" panose="020B0609020204030204" pitchFamily="49" charset="0"/>
+              </a:rPr>
+              <a:t>"Good evening"</a:t>
+            </a:r>
+            <a:r>
+              <a:rPr lang="en-US" sz="4400" dirty="0">
+                <a:solidFill>
+                  <a:srgbClr val="000000"/>
+                </a:solidFill>
+                <a:latin typeface="Consolas" panose="020B0609020204030204" pitchFamily="49" charset="0"/>
+              </a:rPr>
+              <a:t>);</a:t>
+            </a:r>
+            <a:br>
+              <a:rPr lang="en-US" sz="4800" dirty="0">
+                <a:latin typeface="Consolas" panose="020B0609020204030204" pitchFamily="49" charset="0"/>
+              </a:rPr>
+            </a:br>
+            <a:r>
+              <a:rPr lang="en-US" sz="4800" dirty="0">
+                <a:solidFill>
+                  <a:srgbClr val="000000"/>
+                </a:solidFill>
+                <a:latin typeface="Consolas" panose="020B0609020204030204" pitchFamily="49" charset="0"/>
+              </a:rPr>
+              <a:t>}</a:t>
+            </a:r>
+          </a:p>
+        </p:txBody>
+      </p:sp>
+    </p:spTree>
+    <p:extLst>
+      <p:ext uri="{BB962C8B-B14F-4D97-AF65-F5344CB8AC3E}">
+        <p14:creationId xmlns:p14="http://schemas.microsoft.com/office/powerpoint/2010/main" val="353371669"/>
+      </p:ext>
+    </p:extLst>
+  </p:cSld>
+  <p:clrMapOvr>
+    <a:masterClrMapping/>
+  </p:clrMapOvr>
+  <p:transition>
+    <p:fade/>
+  </p:transition>
+  <p:timing>
+    <p:tnLst>
+      <p:par>
+        <p:cTn id="1" dur="indefinite" restart="never" nodeType="tmRoot">
+          <p:childTnLst>
+            <p:seq concurrent="1" nextAc="seek">
+              <p:cTn id="2" dur="indefinite" nodeType="mainSeq">
+                <p:childTnLst>
+                  <p:par>
+                    <p:cTn id="3" fill="hold">
+                      <p:stCondLst>
+                        <p:cond delay="indefinite"/>
+                      </p:stCondLst>
+                      <p:childTnLst>
+                        <p:par>
+                          <p:cTn id="4" fill="hold">
+                            <p:stCondLst>
+                              <p:cond delay="0"/>
+                            </p:stCondLst>
+                            <p:childTnLst>
+                              <p:par>
+                                <p:cTn id="5" presetID="10" presetClass="entr" presetSubtype="0" fill="hold" grpId="0" nodeType="clickEffect">
+                                  <p:stCondLst>
+                                    <p:cond delay="0"/>
+                                  </p:stCondLst>
+                                  <p:childTnLst>
+                                    <p:set>
+                                      <p:cBhvr>
+                                        <p:cTn id="6" dur="1" fill="hold">
+                                          <p:stCondLst>
+                                            <p:cond delay="0"/>
+                                          </p:stCondLst>
+                                        </p:cTn>
+                                        <p:tgtEl>
+                                          <p:spTgt spid="3">
+                                            <p:txEl>
+                                              <p:pRg st="0" end="0"/>
+                                            </p:txEl>
+                                          </p:spTgt>
+                                        </p:tgtEl>
+                                        <p:attrNameLst>
+                                          <p:attrName>style.visibility</p:attrName>
+                                        </p:attrNameLst>
+                                      </p:cBhvr>
+                                      <p:to>
+                                        <p:strVal val="visible"/>
+                                      </p:to>
+                                    </p:set>
+                                    <p:animEffect transition="in" filter="fade">
+                                      <p:cBhvr>
+                                        <p:cTn id="7" dur="500"/>
+                                        <p:tgtEl>
+                                          <p:spTgt spid="3">
+                                            <p:txEl>
+                                              <p:pRg st="0" end="0"/>
+                                            </p:txEl>
+                                          </p:spTgt>
+                                        </p:tgtEl>
+                                      </p:cBhvr>
+                                    </p:animEffect>
+                                  </p:childTnLst>
+                                </p:cTn>
+                              </p:par>
+                            </p:childTnLst>
+                          </p:cTn>
+                        </p:par>
+                      </p:childTnLst>
+                    </p:cTn>
+                  </p:par>
+                </p:childTnLst>
+              </p:cTn>
+              <p:prevCondLst>
+                <p:cond evt="onPrev" delay="0">
+                  <p:tgtEl>
+                    <p:sldTgt/>
+                  </p:tgtEl>
+                </p:cond>
+              </p:prevCondLst>
+              <p:nextCondLst>
+                <p:cond evt="onNext" delay="0">
+                  <p:tgtEl>
+                    <p:sldTgt/>
+                  </p:tgtEl>
+                </p:cond>
+              </p:nextCondLst>
+            </p:seq>
+          </p:childTnLst>
+        </p:cTn>
+      </p:par>
+    </p:tnLst>
+    <p:bldLst>
+      <p:bldP spid="3" grpId="0" uiExpand="1" build="p"/>
+    </p:bldLst>
+  </p:timing>
+</p:sld>
+</file>
+
+<file path=ppt/slides/slide15.xml><?xml version="1.0" encoding="utf-8"?>
+<p:sld xmlns:a="http://schemas.openxmlformats.org/drawingml/2006/main" xmlns:r="http://schemas.openxmlformats.org/officeDocument/2006/relationships" xmlns:p="http://schemas.openxmlformats.org/presentationml/2006/main">
+  <p:cSld>
+    <p:spTree>
+      <p:nvGrpSpPr>
+        <p:cNvPr id="1" name=""/>
+        <p:cNvGrpSpPr/>
+        <p:nvPr/>
+      </p:nvGrpSpPr>
+      <p:grpSpPr>
+        <a:xfrm>
+          <a:off x="0" y="0"/>
+          <a:ext cx="0" cy="0"/>
+          <a:chOff x="0" y="0"/>
+          <a:chExt cx="0" cy="0"/>
+        </a:xfrm>
+      </p:grpSpPr>
+      <p:sp>
+        <p:nvSpPr>
+          <p:cNvPr id="2" name="Title 1"/>
+          <p:cNvSpPr>
+            <a:spLocks noGrp="1"/>
+          </p:cNvSpPr>
+          <p:nvPr>
+            <p:ph type="title"/>
+          </p:nvPr>
+        </p:nvSpPr>
+        <p:spPr/>
+        <p:txBody>
+          <a:bodyPr/>
+          <a:lstStyle/>
+          <a:p>
+            <a:r>
               <a:rPr lang="en-US" dirty="0"/>
               <a:t>The </a:t>
             </a:r>
@@ -39204,7 +39767,7 @@
 </p:sld>
 </file>
 
-<file path=ppt/slides/slide15.xml><?xml version="1.0" encoding="utf-8"?>
+<file path=ppt/slides/slide16.xml><?xml version="1.0" encoding="utf-8"?>
 <p:sld xmlns:a="http://schemas.openxmlformats.org/drawingml/2006/main" xmlns:r="http://schemas.openxmlformats.org/officeDocument/2006/relationships" xmlns:p="http://schemas.openxmlformats.org/presentationml/2006/main">
   <p:cSld>
     <p:bg>
@@ -39299,7 +39862,7 @@
 </p:sld>
 </file>
 
-<file path=ppt/slides/slide16.xml><?xml version="1.0" encoding="utf-8"?>
+<file path=ppt/slides/slide17.xml><?xml version="1.0" encoding="utf-8"?>
 <p:sld xmlns:a="http://schemas.openxmlformats.org/drawingml/2006/main" xmlns:r="http://schemas.openxmlformats.org/officeDocument/2006/relationships" xmlns:p="http://schemas.openxmlformats.org/presentationml/2006/main">
   <p:cSld>
     <p:spTree>
@@ -39566,7 +40129,7 @@
 </p:sld>
 </file>
 
-<file path=ppt/slides/slide17.xml><?xml version="1.0" encoding="utf-8"?>
+<file path=ppt/slides/slide18.xml><?xml version="1.0" encoding="utf-8"?>
 <p:sld xmlns:a="http://schemas.openxmlformats.org/drawingml/2006/main" xmlns:r="http://schemas.openxmlformats.org/officeDocument/2006/relationships" xmlns:p="http://schemas.openxmlformats.org/presentationml/2006/main">
   <p:cSld>
     <p:spTree>
@@ -39748,117 +40311,6 @@
 </p:sld>
 </file>
 
-<file path=ppt/slides/slide18.xml><?xml version="1.0" encoding="utf-8"?>
-<p:sld xmlns:a="http://schemas.openxmlformats.org/drawingml/2006/main" xmlns:r="http://schemas.openxmlformats.org/officeDocument/2006/relationships" xmlns:p="http://schemas.openxmlformats.org/presentationml/2006/main">
-  <p:cSld>
-    <p:spTree>
-      <p:nvGrpSpPr>
-        <p:cNvPr id="1" name=""/>
-        <p:cNvGrpSpPr/>
-        <p:nvPr/>
-      </p:nvGrpSpPr>
-      <p:grpSpPr>
-        <a:xfrm>
-          <a:off x="0" y="0"/>
-          <a:ext cx="0" cy="0"/>
-          <a:chOff x="0" y="0"/>
-          <a:chExt cx="0" cy="0"/>
-        </a:xfrm>
-      </p:grpSpPr>
-      <p:sp>
-        <p:nvSpPr>
-          <p:cNvPr id="2" name="Title 1"/>
-          <p:cNvSpPr>
-            <a:spLocks noGrp="1"/>
-          </p:cNvSpPr>
-          <p:nvPr>
-            <p:ph type="title"/>
-          </p:nvPr>
-        </p:nvSpPr>
-        <p:spPr/>
-        <p:txBody>
-          <a:bodyPr/>
-          <a:lstStyle/>
-          <a:p>
-            <a:r>
-              <a:rPr lang="en-US" dirty="0"/>
-              <a:t>Mini-quiz: What’s the value?</a:t>
-            </a:r>
-          </a:p>
-        </p:txBody>
-      </p:sp>
-      <p:sp>
-        <p:nvSpPr>
-          <p:cNvPr id="3" name="Content Placeholder 2"/>
-          <p:cNvSpPr>
-            <a:spLocks noGrp="1"/>
-          </p:cNvSpPr>
-          <p:nvPr>
-            <p:ph idx="1"/>
-          </p:nvPr>
-        </p:nvSpPr>
-        <p:spPr/>
-        <p:txBody>
-          <a:bodyPr anchor="ctr">
-            <a:normAutofit/>
-          </a:bodyPr>
-          <a:lstStyle/>
-          <a:p>
-            <a:pPr marL="57150" indent="0" algn="ctr">
-              <a:buNone/>
-            </a:pPr>
-            <a:r>
-              <a:rPr lang="en-US" sz="11500" dirty="0">
-                <a:solidFill>
-                  <a:srgbClr val="098658"/>
-                </a:solidFill>
-                <a:latin typeface="Consolas" panose="020B0609020204030204" pitchFamily="49" charset="0"/>
-              </a:rPr>
-              <a:t>5</a:t>
-            </a:r>
-            <a:r>
-              <a:rPr lang="en-US" sz="11500" dirty="0">
-                <a:solidFill>
-                  <a:srgbClr val="000000"/>
-                </a:solidFill>
-                <a:latin typeface="Consolas" panose="020B0609020204030204" pitchFamily="49" charset="0"/>
-              </a:rPr>
-              <a:t> &gt; </a:t>
-            </a:r>
-            <a:r>
-              <a:rPr lang="en-US" sz="11500" dirty="0">
-                <a:solidFill>
-                  <a:srgbClr val="098658"/>
-                </a:solidFill>
-                <a:latin typeface="Consolas" panose="020B0609020204030204" pitchFamily="49" charset="0"/>
-              </a:rPr>
-              <a:t>5</a:t>
-            </a:r>
-            <a:endParaRPr lang="en-US" sz="11500" dirty="0">
-              <a:solidFill>
-                <a:srgbClr val="000000"/>
-              </a:solidFill>
-              <a:latin typeface="Consolas" panose="020B0609020204030204" pitchFamily="49" charset="0"/>
-            </a:endParaRPr>
-          </a:p>
-        </p:txBody>
-      </p:sp>
-    </p:spTree>
-    <p:extLst>
-      <p:ext uri="{BB962C8B-B14F-4D97-AF65-F5344CB8AC3E}">
-        <p14:creationId xmlns:p14="http://schemas.microsoft.com/office/powerpoint/2010/main" val="2521062439"/>
-      </p:ext>
-    </p:extLst>
-  </p:cSld>
-  <p:clrMapOvr>
-    <a:masterClrMapping/>
-  </p:clrMapOvr>
-  <p:transition>
-    <p:fade/>
-  </p:transition>
-</p:sld>
-</file>
-
 <file path=ppt/slides/slide19.xml><?xml version="1.0" encoding="utf-8"?>
 <p:sld xmlns:a="http://schemas.openxmlformats.org/drawingml/2006/main" xmlns:r="http://schemas.openxmlformats.org/officeDocument/2006/relationships" xmlns:p="http://schemas.openxmlformats.org/presentationml/2006/main">
   <p:cSld>
@@ -39915,17 +40367,17 @@
           </a:bodyPr>
           <a:lstStyle/>
           <a:p>
-            <a:pPr marL="0" indent="0" algn="ctr">
+            <a:pPr marL="57150" indent="0" algn="ctr">
               <a:buNone/>
             </a:pPr>
             <a:r>
               <a:rPr lang="en-US" sz="11500" dirty="0">
                 <a:solidFill>
-                  <a:srgbClr val="A31515"/>
+                  <a:srgbClr val="098658"/>
                 </a:solidFill>
                 <a:latin typeface="Consolas" panose="020B0609020204030204" pitchFamily="49" charset="0"/>
               </a:rPr>
-              <a:t>"Hi"</a:t>
+              <a:t>5</a:t>
             </a:r>
             <a:r>
               <a:rPr lang="en-US" sz="11500" dirty="0">
@@ -39934,16 +40386,16 @@
                 </a:solidFill>
                 <a:latin typeface="Consolas" panose="020B0609020204030204" pitchFamily="49" charset="0"/>
               </a:rPr>
-              <a:t> === </a:t>
+              <a:t> &gt; </a:t>
             </a:r>
             <a:r>
               <a:rPr lang="en-US" sz="11500" dirty="0">
                 <a:solidFill>
-                  <a:srgbClr val="A31515"/>
+                  <a:srgbClr val="098658"/>
                 </a:solidFill>
                 <a:latin typeface="Consolas" panose="020B0609020204030204" pitchFamily="49" charset="0"/>
               </a:rPr>
-              <a:t>"Hi"</a:t>
+              <a:t>5</a:t>
             </a:r>
             <a:endParaRPr lang="en-US" sz="11500" dirty="0">
               <a:solidFill>
@@ -39957,7 +40409,7 @@
     </p:spTree>
     <p:extLst>
       <p:ext uri="{BB962C8B-B14F-4D97-AF65-F5344CB8AC3E}">
-        <p14:creationId xmlns:p14="http://schemas.microsoft.com/office/powerpoint/2010/main" val="768053228"/>
+        <p14:creationId xmlns:p14="http://schemas.microsoft.com/office/powerpoint/2010/main" val="2521062439"/>
       </p:ext>
     </p:extLst>
   </p:cSld>
@@ -40136,6 +40588,117 @@
               <a:buNone/>
             </a:pPr>
             <a:r>
+              <a:rPr lang="en-US" sz="11500" dirty="0">
+                <a:solidFill>
+                  <a:srgbClr val="A31515"/>
+                </a:solidFill>
+                <a:latin typeface="Consolas" panose="020B0609020204030204" pitchFamily="49" charset="0"/>
+              </a:rPr>
+              <a:t>"Hi"</a:t>
+            </a:r>
+            <a:r>
+              <a:rPr lang="en-US" sz="11500" dirty="0">
+                <a:solidFill>
+                  <a:srgbClr val="000000"/>
+                </a:solidFill>
+                <a:latin typeface="Consolas" panose="020B0609020204030204" pitchFamily="49" charset="0"/>
+              </a:rPr>
+              <a:t> === </a:t>
+            </a:r>
+            <a:r>
+              <a:rPr lang="en-US" sz="11500" dirty="0">
+                <a:solidFill>
+                  <a:srgbClr val="A31515"/>
+                </a:solidFill>
+                <a:latin typeface="Consolas" panose="020B0609020204030204" pitchFamily="49" charset="0"/>
+              </a:rPr>
+              <a:t>"Hi"</a:t>
+            </a:r>
+            <a:endParaRPr lang="en-US" sz="11500" dirty="0">
+              <a:solidFill>
+                <a:srgbClr val="000000"/>
+              </a:solidFill>
+              <a:latin typeface="Consolas" panose="020B0609020204030204" pitchFamily="49" charset="0"/>
+            </a:endParaRPr>
+          </a:p>
+        </p:txBody>
+      </p:sp>
+    </p:spTree>
+    <p:extLst>
+      <p:ext uri="{BB962C8B-B14F-4D97-AF65-F5344CB8AC3E}">
+        <p14:creationId xmlns:p14="http://schemas.microsoft.com/office/powerpoint/2010/main" val="768053228"/>
+      </p:ext>
+    </p:extLst>
+  </p:cSld>
+  <p:clrMapOvr>
+    <a:masterClrMapping/>
+  </p:clrMapOvr>
+  <p:transition>
+    <p:fade/>
+  </p:transition>
+</p:sld>
+</file>
+
+<file path=ppt/slides/slide21.xml><?xml version="1.0" encoding="utf-8"?>
+<p:sld xmlns:a="http://schemas.openxmlformats.org/drawingml/2006/main" xmlns:r="http://schemas.openxmlformats.org/officeDocument/2006/relationships" xmlns:p="http://schemas.openxmlformats.org/presentationml/2006/main">
+  <p:cSld>
+    <p:spTree>
+      <p:nvGrpSpPr>
+        <p:cNvPr id="1" name=""/>
+        <p:cNvGrpSpPr/>
+        <p:nvPr/>
+      </p:nvGrpSpPr>
+      <p:grpSpPr>
+        <a:xfrm>
+          <a:off x="0" y="0"/>
+          <a:ext cx="0" cy="0"/>
+          <a:chOff x="0" y="0"/>
+          <a:chExt cx="0" cy="0"/>
+        </a:xfrm>
+      </p:grpSpPr>
+      <p:sp>
+        <p:nvSpPr>
+          <p:cNvPr id="2" name="Title 1"/>
+          <p:cNvSpPr>
+            <a:spLocks noGrp="1"/>
+          </p:cNvSpPr>
+          <p:nvPr>
+            <p:ph type="title"/>
+          </p:nvPr>
+        </p:nvSpPr>
+        <p:spPr/>
+        <p:txBody>
+          <a:bodyPr/>
+          <a:lstStyle/>
+          <a:p>
+            <a:r>
+              <a:rPr lang="en-US" dirty="0"/>
+              <a:t>Mini-quiz: What’s the value?</a:t>
+            </a:r>
+          </a:p>
+        </p:txBody>
+      </p:sp>
+      <p:sp>
+        <p:nvSpPr>
+          <p:cNvPr id="3" name="Content Placeholder 2"/>
+          <p:cNvSpPr>
+            <a:spLocks noGrp="1"/>
+          </p:cNvSpPr>
+          <p:nvPr>
+            <p:ph idx="1"/>
+          </p:nvPr>
+        </p:nvSpPr>
+        <p:spPr/>
+        <p:txBody>
+          <a:bodyPr anchor="ctr">
+            <a:normAutofit/>
+          </a:bodyPr>
+          <a:lstStyle/>
+          <a:p>
+            <a:pPr marL="0" indent="0" algn="ctr">
+              <a:buNone/>
+            </a:pPr>
+            <a:r>
               <a:rPr lang="en-US" sz="7200" dirty="0">
                 <a:solidFill>
                   <a:srgbClr val="A31515"/>
@@ -40187,7 +40750,7 @@
 </p:sld>
 </file>
 
-<file path=ppt/slides/slide21.xml><?xml version="1.0" encoding="utf-8"?>
+<file path=ppt/slides/slide22.xml><?xml version="1.0" encoding="utf-8"?>
 <p:sld xmlns:a="http://schemas.openxmlformats.org/drawingml/2006/main" xmlns:r="http://schemas.openxmlformats.org/officeDocument/2006/relationships" xmlns:p="http://schemas.openxmlformats.org/presentationml/2006/main">
   <p:cSld>
     <p:spTree>
@@ -40470,7 +41033,7 @@
 </p:sld>
 </file>
 
-<file path=ppt/slides/slide22.xml><?xml version="1.0" encoding="utf-8"?>
+<file path=ppt/slides/slide23.xml><?xml version="1.0" encoding="utf-8"?>
 <p:sld xmlns:a="http://schemas.openxmlformats.org/drawingml/2006/main" xmlns:r="http://schemas.openxmlformats.org/officeDocument/2006/relationships" xmlns:p="http://schemas.openxmlformats.org/presentationml/2006/main">
   <p:cSld>
     <p:spTree>
@@ -40877,7 +41440,7 @@
 </p:sld>
 </file>
 
-<file path=ppt/slides/slide23.xml><?xml version="1.0" encoding="utf-8"?>
+<file path=ppt/slides/slide24.xml><?xml version="1.0" encoding="utf-8"?>
 <p:sld xmlns:a="http://schemas.openxmlformats.org/drawingml/2006/main" xmlns:r="http://schemas.openxmlformats.org/officeDocument/2006/relationships" xmlns:p="http://schemas.openxmlformats.org/presentationml/2006/main">
   <p:cSld>
     <p:spTree>

</xml_diff>